<commit_message>
Mais Trabalho na Apresentacao
</commit_message>
<xml_diff>
--- a/apresentacao.pptx
+++ b/apresentacao.pptx
@@ -9,11 +9,13 @@
     <p:sldId id="257" r:id="rId3"/>
     <p:sldId id="259" r:id="rId4"/>
     <p:sldId id="260" r:id="rId5"/>
-    <p:sldId id="261" r:id="rId6"/>
-    <p:sldId id="263" r:id="rId7"/>
-    <p:sldId id="264" r:id="rId8"/>
-    <p:sldId id="262" r:id="rId9"/>
-    <p:sldId id="258" r:id="rId10"/>
+    <p:sldId id="268" r:id="rId6"/>
+    <p:sldId id="266" r:id="rId7"/>
+    <p:sldId id="267" r:id="rId8"/>
+    <p:sldId id="261" r:id="rId9"/>
+    <p:sldId id="263" r:id="rId10"/>
+    <p:sldId id="265" r:id="rId11"/>
+    <p:sldId id="258" r:id="rId12"/>
   </p:sldIdLst>
   <p:sldSz cx="12192000" cy="6858000"/>
   <p:notesSz cx="6858000" cy="9144000"/>
@@ -267,7 +269,7 @@
           <a:p>
             <a:fld id="{BFD1AF64-45C7-4B38-BC50-405CD7E676A3}" type="datetimeFigureOut">
               <a:rPr lang="pt-BR" smtClean="0"/>
-              <a:t>27/11/2021</a:t>
+              <a:t>28/11/2021</a:t>
             </a:fld>
             <a:endParaRPr lang="pt-BR"/>
           </a:p>
@@ -468,7 +470,7 @@
           <a:p>
             <a:fld id="{BFD1AF64-45C7-4B38-BC50-405CD7E676A3}" type="datetimeFigureOut">
               <a:rPr lang="pt-BR" smtClean="0"/>
-              <a:t>27/11/2021</a:t>
+              <a:t>28/11/2021</a:t>
             </a:fld>
             <a:endParaRPr lang="pt-BR"/>
           </a:p>
@@ -679,7 +681,7 @@
           <a:p>
             <a:fld id="{BFD1AF64-45C7-4B38-BC50-405CD7E676A3}" type="datetimeFigureOut">
               <a:rPr lang="pt-BR" smtClean="0"/>
-              <a:t>27/11/2021</a:t>
+              <a:t>28/11/2021</a:t>
             </a:fld>
             <a:endParaRPr lang="pt-BR"/>
           </a:p>
@@ -880,7 +882,7 @@
           <a:p>
             <a:fld id="{BFD1AF64-45C7-4B38-BC50-405CD7E676A3}" type="datetimeFigureOut">
               <a:rPr lang="pt-BR" smtClean="0"/>
-              <a:t>27/11/2021</a:t>
+              <a:t>28/11/2021</a:t>
             </a:fld>
             <a:endParaRPr lang="pt-BR"/>
           </a:p>
@@ -1158,7 +1160,7 @@
           <a:p>
             <a:fld id="{BFD1AF64-45C7-4B38-BC50-405CD7E676A3}" type="datetimeFigureOut">
               <a:rPr lang="pt-BR" smtClean="0"/>
-              <a:t>27/11/2021</a:t>
+              <a:t>28/11/2021</a:t>
             </a:fld>
             <a:endParaRPr lang="pt-BR"/>
           </a:p>
@@ -1426,7 +1428,7 @@
           <a:p>
             <a:fld id="{BFD1AF64-45C7-4B38-BC50-405CD7E676A3}" type="datetimeFigureOut">
               <a:rPr lang="pt-BR" smtClean="0"/>
-              <a:t>27/11/2021</a:t>
+              <a:t>28/11/2021</a:t>
             </a:fld>
             <a:endParaRPr lang="pt-BR"/>
           </a:p>
@@ -1841,7 +1843,7 @@
           <a:p>
             <a:fld id="{BFD1AF64-45C7-4B38-BC50-405CD7E676A3}" type="datetimeFigureOut">
               <a:rPr lang="pt-BR" smtClean="0"/>
-              <a:t>27/11/2021</a:t>
+              <a:t>28/11/2021</a:t>
             </a:fld>
             <a:endParaRPr lang="pt-BR"/>
           </a:p>
@@ -1985,7 +1987,7 @@
           <a:p>
             <a:fld id="{BFD1AF64-45C7-4B38-BC50-405CD7E676A3}" type="datetimeFigureOut">
               <a:rPr lang="pt-BR" smtClean="0"/>
-              <a:t>27/11/2021</a:t>
+              <a:t>28/11/2021</a:t>
             </a:fld>
             <a:endParaRPr lang="pt-BR"/>
           </a:p>
@@ -2101,7 +2103,7 @@
           <a:p>
             <a:fld id="{BFD1AF64-45C7-4B38-BC50-405CD7E676A3}" type="datetimeFigureOut">
               <a:rPr lang="pt-BR" smtClean="0"/>
-              <a:t>27/11/2021</a:t>
+              <a:t>28/11/2021</a:t>
             </a:fld>
             <a:endParaRPr lang="pt-BR"/>
           </a:p>
@@ -2415,7 +2417,7 @@
           <a:p>
             <a:fld id="{BFD1AF64-45C7-4B38-BC50-405CD7E676A3}" type="datetimeFigureOut">
               <a:rPr lang="pt-BR" smtClean="0"/>
-              <a:t>27/11/2021</a:t>
+              <a:t>28/11/2021</a:t>
             </a:fld>
             <a:endParaRPr lang="pt-BR"/>
           </a:p>
@@ -2706,7 +2708,7 @@
           <a:p>
             <a:fld id="{BFD1AF64-45C7-4B38-BC50-405CD7E676A3}" type="datetimeFigureOut">
               <a:rPr lang="pt-BR" smtClean="0"/>
-              <a:t>27/11/2021</a:t>
+              <a:t>28/11/2021</a:t>
             </a:fld>
             <a:endParaRPr lang="pt-BR"/>
           </a:p>
@@ -2959,7 +2961,7 @@
           <a:p>
             <a:fld id="{BFD1AF64-45C7-4B38-BC50-405CD7E676A3}" type="datetimeFigureOut">
               <a:rPr lang="pt-BR" smtClean="0"/>
-              <a:t>27/11/2021</a:t>
+              <a:t>28/11/2021</a:t>
             </a:fld>
             <a:endParaRPr lang="pt-BR"/>
           </a:p>
@@ -3429,7 +3431,7 @@
         <p:spPr>
           <a:xfrm>
             <a:off x="589441" y="4279986"/>
-            <a:ext cx="7835318" cy="954107"/>
+            <a:ext cx="7835318" cy="523220"/>
           </a:xfrm>
           <a:prstGeom prst="rect">
             <a:avLst/>
@@ -3448,7 +3450,21 @@
                 <a:latin typeface="Gotham Book" pitchFamily="2" charset="0"/>
                 <a:cs typeface="Gotham Book" pitchFamily="2" charset="0"/>
               </a:rPr>
-              <a:t>API REST em Node utilizando um arquivo JSON</a:t>
+              <a:t>API REST em Node utilizando </a:t>
+            </a:r>
+            <a:r>
+              <a:rPr lang="pt-BR" sz="2800" b="1" dirty="0" smtClean="0">
+                <a:latin typeface="Gotham Book" pitchFamily="2" charset="0"/>
+                <a:cs typeface="Gotham Book" pitchFamily="2" charset="0"/>
+              </a:rPr>
+              <a:t>arquivo </a:t>
+            </a:r>
+            <a:r>
+              <a:rPr lang="pt-BR" sz="2800" b="1" dirty="0" smtClean="0">
+                <a:latin typeface="Gotham Book" pitchFamily="2" charset="0"/>
+                <a:cs typeface="Gotham Book" pitchFamily="2" charset="0"/>
+              </a:rPr>
+              <a:t>JSON</a:t>
             </a:r>
             <a:endParaRPr lang="pt-BR" sz="3200" b="1" dirty="0">
               <a:latin typeface="Gotham Bold" pitchFamily="2" charset="0"/>
@@ -3514,6 +3530,471 @@
     <p:extLst>
       <p:ext uri="{BB962C8B-B14F-4D97-AF65-F5344CB8AC3E}">
         <p14:creationId xmlns:p14="http://schemas.microsoft.com/office/powerpoint/2010/main" val="3089261754"/>
+      </p:ext>
+    </p:extLst>
+  </p:cSld>
+  <p:clrMapOvr>
+    <a:masterClrMapping/>
+  </p:clrMapOvr>
+  <p:transition spd="slow">
+    <p:push dir="u"/>
+  </p:transition>
+</p:sld>
+</file>
+
+<file path=ppt/slides/slide10.xml><?xml version="1.0" encoding="utf-8"?>
+<p:sld xmlns:a="http://schemas.openxmlformats.org/drawingml/2006/main" xmlns:r="http://schemas.openxmlformats.org/officeDocument/2006/relationships" xmlns:p="http://schemas.openxmlformats.org/presentationml/2006/main">
+  <p:cSld>
+    <p:spTree>
+      <p:nvGrpSpPr>
+        <p:cNvPr id="1" name=""/>
+        <p:cNvGrpSpPr/>
+        <p:nvPr/>
+      </p:nvGrpSpPr>
+      <p:grpSpPr>
+        <a:xfrm>
+          <a:off x="0" y="0"/>
+          <a:ext cx="0" cy="0"/>
+          <a:chOff x="0" y="0"/>
+          <a:chExt cx="0" cy="0"/>
+        </a:xfrm>
+      </p:grpSpPr>
+      <p:sp>
+        <p:nvSpPr>
+          <p:cNvPr id="2" name="CaixaDeTexto 1">
+            <a:extLst>
+              <a:ext uri="{FF2B5EF4-FFF2-40B4-BE49-F238E27FC236}">
+                <a16:creationId xmlns:a16="http://schemas.microsoft.com/office/drawing/2014/main" id="{E320B4AF-8A7C-4B16-B485-781F37053548}"/>
+              </a:ext>
+            </a:extLst>
+          </p:cNvPr>
+          <p:cNvSpPr txBox="1"/>
+          <p:nvPr/>
+        </p:nvSpPr>
+        <p:spPr>
+          <a:xfrm>
+            <a:off x="3495413" y="444617"/>
+            <a:ext cx="6114100" cy="400110"/>
+          </a:xfrm>
+          <a:prstGeom prst="rect">
+            <a:avLst/>
+          </a:prstGeom>
+          <a:noFill/>
+        </p:spPr>
+        <p:txBody>
+          <a:bodyPr wrap="square" rtlCol="0">
+            <a:spAutoFit/>
+          </a:bodyPr>
+          <a:lstStyle/>
+          <a:p>
+            <a:r>
+              <a:rPr lang="pt-BR" sz="2000" b="1" dirty="0">
+                <a:latin typeface="Gotham Book" pitchFamily="2" charset="0"/>
+                <a:cs typeface="Gotham Book" pitchFamily="2" charset="0"/>
+              </a:rPr>
+              <a:t>Bibliotecas utilizadas no node.js</a:t>
+            </a:r>
+            <a:endParaRPr lang="pt-BR" sz="2000" b="1" dirty="0">
+              <a:latin typeface="Gotham Bold" pitchFamily="2" charset="0"/>
+              <a:cs typeface="Gotham Bold" pitchFamily="2" charset="0"/>
+            </a:endParaRPr>
+          </a:p>
+        </p:txBody>
+      </p:sp>
+      <p:sp>
+        <p:nvSpPr>
+          <p:cNvPr id="3" name="CaixaDeTexto 2">
+            <a:extLst>
+              <a:ext uri="{FF2B5EF4-FFF2-40B4-BE49-F238E27FC236}">
+                <a16:creationId xmlns:a16="http://schemas.microsoft.com/office/drawing/2014/main" id="{832FD19A-27D8-40DC-BF12-FE0103F089F5}"/>
+              </a:ext>
+            </a:extLst>
+          </p:cNvPr>
+          <p:cNvSpPr txBox="1"/>
+          <p:nvPr/>
+        </p:nvSpPr>
+        <p:spPr>
+          <a:xfrm>
+            <a:off x="3495413" y="1712031"/>
+            <a:ext cx="5201174" cy="4693593"/>
+          </a:xfrm>
+          <a:prstGeom prst="rect">
+            <a:avLst/>
+          </a:prstGeom>
+          <a:noFill/>
+        </p:spPr>
+        <p:txBody>
+          <a:bodyPr wrap="square" rtlCol="0">
+            <a:spAutoFit/>
+          </a:bodyPr>
+          <a:lstStyle/>
+          <a:p>
+            <a:r>
+              <a:rPr lang="pt-BR" sz="1500" b="1" dirty="0" smtClean="0">
+                <a:latin typeface="Gotham Book" pitchFamily="2" charset="0"/>
+                <a:cs typeface="Gotham Book" pitchFamily="2" charset="0"/>
+              </a:rPr>
+              <a:t>CELEBRATE</a:t>
+            </a:r>
+          </a:p>
+          <a:p>
+            <a:endParaRPr lang="pt-BR" sz="1500" b="1" dirty="0">
+              <a:latin typeface="Gotham Book" pitchFamily="2" charset="0"/>
+              <a:cs typeface="Gotham Book" pitchFamily="2" charset="0"/>
+            </a:endParaRPr>
+          </a:p>
+          <a:p>
+            <a:r>
+              <a:rPr lang="pt-BR" sz="1500" dirty="0">
+                <a:solidFill>
+                  <a:srgbClr val="00B0F0"/>
+                </a:solidFill>
+                <a:latin typeface="Gotham Book" pitchFamily="2" charset="0"/>
+                <a:cs typeface="Gotham Book" pitchFamily="2" charset="0"/>
+              </a:rPr>
+              <a:t>https://github.com/arb/celebrate</a:t>
+            </a:r>
+            <a:r>
+              <a:rPr lang="pt-BR" sz="1500" b="1" dirty="0" smtClean="0">
+                <a:latin typeface="Gotham Book" pitchFamily="2" charset="0"/>
+                <a:cs typeface="Gotham Book" pitchFamily="2" charset="0"/>
+              </a:rPr>
+              <a:t/>
+            </a:r>
+            <a:br>
+              <a:rPr lang="pt-BR" sz="1500" b="1" dirty="0" smtClean="0">
+                <a:latin typeface="Gotham Book" pitchFamily="2" charset="0"/>
+                <a:cs typeface="Gotham Book" pitchFamily="2" charset="0"/>
+              </a:rPr>
+            </a:br>
+            <a:endParaRPr lang="pt-BR" sz="1500" b="1" dirty="0" smtClean="0">
+              <a:latin typeface="Gotham Book" pitchFamily="2" charset="0"/>
+              <a:cs typeface="Gotham Book" pitchFamily="2" charset="0"/>
+            </a:endParaRPr>
+          </a:p>
+          <a:p>
+            <a:r>
+              <a:rPr lang="pt-BR" sz="1500" dirty="0" smtClean="0">
+                <a:latin typeface="Gotham Book" pitchFamily="2" charset="0"/>
+                <a:cs typeface="Gotham Book" pitchFamily="2" charset="0"/>
+              </a:rPr>
+              <a:t>É um middleware para o </a:t>
+            </a:r>
+            <a:r>
+              <a:rPr lang="pt-BR" sz="1500" dirty="0" err="1" smtClean="0">
+                <a:latin typeface="Gotham Book" pitchFamily="2" charset="0"/>
+                <a:cs typeface="Gotham Book" pitchFamily="2" charset="0"/>
+              </a:rPr>
+              <a:t>express</a:t>
+            </a:r>
+            <a:r>
+              <a:rPr lang="pt-BR" sz="1500" dirty="0" smtClean="0">
+                <a:latin typeface="Gotham Book" pitchFamily="2" charset="0"/>
+                <a:cs typeface="Gotham Book" pitchFamily="2" charset="0"/>
+              </a:rPr>
+              <a:t> para validações.</a:t>
+            </a:r>
+          </a:p>
+          <a:p>
+            <a:endParaRPr lang="pt-BR" sz="1500" dirty="0">
+              <a:latin typeface="Gotham Book" pitchFamily="2" charset="0"/>
+              <a:cs typeface="Gotham Book" pitchFamily="2" charset="0"/>
+            </a:endParaRPr>
+          </a:p>
+          <a:p>
+            <a:r>
+              <a:rPr lang="pt-BR" sz="1500" dirty="0" smtClean="0">
+                <a:latin typeface="Gotham Book" pitchFamily="2" charset="0"/>
+                <a:cs typeface="Gotham Book" pitchFamily="2" charset="0"/>
+              </a:rPr>
+              <a:t>Foi utilizada para garantir o tipo correto de dados enviados em requisições.</a:t>
+            </a:r>
+          </a:p>
+          <a:p>
+            <a:endParaRPr lang="pt-BR" sz="1500" dirty="0">
+              <a:latin typeface="Gotham Book" pitchFamily="2" charset="0"/>
+              <a:cs typeface="Gotham Book" pitchFamily="2" charset="0"/>
+            </a:endParaRPr>
+          </a:p>
+          <a:p>
+            <a:r>
+              <a:rPr lang="pt-BR" sz="1500" dirty="0" smtClean="0">
+                <a:latin typeface="Gotham Book" pitchFamily="2" charset="0"/>
+                <a:cs typeface="Gotham Book" pitchFamily="2" charset="0"/>
+              </a:rPr>
+              <a:t>O tipo correto, no caso, foram aqueles estabelecidos para o projeto:</a:t>
+            </a:r>
+          </a:p>
+          <a:p>
+            <a:endParaRPr lang="pt-BR" sz="1500" dirty="0" smtClean="0">
+              <a:latin typeface="+mj-lt"/>
+              <a:cs typeface="Gotham Book" pitchFamily="2" charset="0"/>
+            </a:endParaRPr>
+          </a:p>
+          <a:p>
+            <a:r>
+              <a:rPr lang="pt-BR" sz="1400" dirty="0">
+                <a:latin typeface="+mj-lt"/>
+                <a:cs typeface="Gotham Book" pitchFamily="2" charset="0"/>
+              </a:rPr>
+              <a:t>O id é do tipo inteiro.</a:t>
+            </a:r>
+          </a:p>
+          <a:p>
+            <a:r>
+              <a:rPr lang="pt-BR" sz="1400" dirty="0">
+                <a:latin typeface="+mj-lt"/>
+                <a:cs typeface="Gotham Book" pitchFamily="2" charset="0"/>
+              </a:rPr>
+              <a:t>O nome é uma </a:t>
+            </a:r>
+            <a:r>
+              <a:rPr lang="pt-BR" sz="1400" dirty="0" err="1">
+                <a:latin typeface="+mj-lt"/>
+                <a:cs typeface="Gotham Book" pitchFamily="2" charset="0"/>
+              </a:rPr>
+              <a:t>string</a:t>
+            </a:r>
+            <a:r>
+              <a:rPr lang="pt-BR" sz="1400" dirty="0">
+                <a:latin typeface="+mj-lt"/>
+                <a:cs typeface="Gotham Book" pitchFamily="2" charset="0"/>
+              </a:rPr>
+              <a:t>.</a:t>
+            </a:r>
+          </a:p>
+          <a:p>
+            <a:r>
+              <a:rPr lang="pt-BR" sz="1400" dirty="0">
+                <a:latin typeface="+mj-lt"/>
+                <a:cs typeface="Gotham Book" pitchFamily="2" charset="0"/>
+              </a:rPr>
+              <a:t>O endereço é uma </a:t>
+            </a:r>
+            <a:r>
+              <a:rPr lang="pt-BR" sz="1400" dirty="0" err="1">
+                <a:latin typeface="+mj-lt"/>
+                <a:cs typeface="Gotham Book" pitchFamily="2" charset="0"/>
+              </a:rPr>
+              <a:t>string</a:t>
+            </a:r>
+            <a:r>
+              <a:rPr lang="pt-BR" sz="1400" dirty="0">
+                <a:latin typeface="+mj-lt"/>
+                <a:cs typeface="Gotham Book" pitchFamily="2" charset="0"/>
+              </a:rPr>
+              <a:t>.</a:t>
+            </a:r>
+          </a:p>
+          <a:p>
+            <a:r>
+              <a:rPr lang="pt-BR" sz="1400" dirty="0">
+                <a:latin typeface="+mj-lt"/>
+                <a:cs typeface="Gotham Book" pitchFamily="2" charset="0"/>
+              </a:rPr>
+              <a:t>O </a:t>
+            </a:r>
+            <a:r>
+              <a:rPr lang="pt-BR" sz="1400" dirty="0" err="1">
+                <a:latin typeface="+mj-lt"/>
+                <a:cs typeface="Gotham Book" pitchFamily="2" charset="0"/>
+              </a:rPr>
+              <a:t>cep</a:t>
+            </a:r>
+            <a:r>
+              <a:rPr lang="pt-BR" sz="1400" dirty="0">
+                <a:latin typeface="+mj-lt"/>
+                <a:cs typeface="Gotham Book" pitchFamily="2" charset="0"/>
+              </a:rPr>
+              <a:t> é uma </a:t>
+            </a:r>
+            <a:r>
+              <a:rPr lang="pt-BR" sz="1400" dirty="0" err="1">
+                <a:latin typeface="+mj-lt"/>
+                <a:cs typeface="Gotham Book" pitchFamily="2" charset="0"/>
+              </a:rPr>
+              <a:t>string</a:t>
+            </a:r>
+            <a:r>
+              <a:rPr lang="pt-BR" sz="1400" dirty="0">
+                <a:latin typeface="+mj-lt"/>
+                <a:cs typeface="Gotham Book" pitchFamily="2" charset="0"/>
+              </a:rPr>
+              <a:t>;</a:t>
+            </a:r>
+          </a:p>
+          <a:p>
+            <a:r>
+              <a:rPr lang="pt-BR" sz="1400" dirty="0">
+                <a:latin typeface="+mj-lt"/>
+              </a:rPr>
+              <a:t>A data de nascimento é uma </a:t>
+            </a:r>
+            <a:r>
+              <a:rPr lang="pt-BR" sz="1400" dirty="0" err="1">
+                <a:latin typeface="+mj-lt"/>
+              </a:rPr>
+              <a:t>string</a:t>
+            </a:r>
+            <a:r>
+              <a:rPr lang="pt-BR" sz="1400" dirty="0">
+                <a:latin typeface="+mj-lt"/>
+              </a:rPr>
+              <a:t> de data seguindo o padrão ISO 8601.</a:t>
+            </a:r>
+          </a:p>
+          <a:p>
+            <a:r>
+              <a:rPr lang="pt-BR" sz="1400" dirty="0">
+                <a:latin typeface="+mj-lt"/>
+              </a:rPr>
+              <a:t>O telefone é um inteiro.</a:t>
+            </a:r>
+          </a:p>
+          <a:p>
+            <a:endParaRPr lang="pt-BR" sz="1500" dirty="0" smtClean="0">
+              <a:latin typeface="Gotham Book" pitchFamily="2" charset="0"/>
+              <a:cs typeface="Gotham Book" pitchFamily="2" charset="0"/>
+            </a:endParaRPr>
+          </a:p>
+        </p:txBody>
+      </p:sp>
+    </p:spTree>
+    <p:extLst>
+      <p:ext uri="{BB962C8B-B14F-4D97-AF65-F5344CB8AC3E}">
+        <p14:creationId xmlns:p14="http://schemas.microsoft.com/office/powerpoint/2010/main" val="3751228429"/>
+      </p:ext>
+    </p:extLst>
+  </p:cSld>
+  <p:clrMapOvr>
+    <a:masterClrMapping/>
+  </p:clrMapOvr>
+  <p:transition spd="slow">
+    <p:push dir="u"/>
+  </p:transition>
+</p:sld>
+</file>
+
+<file path=ppt/slides/slide11.xml><?xml version="1.0" encoding="utf-8"?>
+<p:sld xmlns:a="http://schemas.openxmlformats.org/drawingml/2006/main" xmlns:r="http://schemas.openxmlformats.org/officeDocument/2006/relationships" xmlns:p="http://schemas.openxmlformats.org/presentationml/2006/main">
+  <p:cSld>
+    <p:spTree>
+      <p:nvGrpSpPr>
+        <p:cNvPr id="1" name=""/>
+        <p:cNvGrpSpPr/>
+        <p:nvPr/>
+      </p:nvGrpSpPr>
+      <p:grpSpPr>
+        <a:xfrm>
+          <a:off x="0" y="0"/>
+          <a:ext cx="0" cy="0"/>
+          <a:chOff x="0" y="0"/>
+          <a:chExt cx="0" cy="0"/>
+        </a:xfrm>
+      </p:grpSpPr>
+      <p:pic>
+        <p:nvPicPr>
+          <p:cNvPr id="4" name="Imagem 3">
+            <a:extLst>
+              <a:ext uri="{FF2B5EF4-FFF2-40B4-BE49-F238E27FC236}">
+                <a16:creationId xmlns:a16="http://schemas.microsoft.com/office/drawing/2014/main" id="{BFD66423-0AA6-432C-9D58-3A0F7E3684A5}"/>
+              </a:ext>
+            </a:extLst>
+          </p:cNvPr>
+          <p:cNvPicPr>
+            <a:picLocks noChangeAspect="1"/>
+          </p:cNvPicPr>
+          <p:nvPr/>
+        </p:nvPicPr>
+        <p:blipFill>
+          <a:blip r:embed="rId2">
+            <a:extLst>
+              <a:ext uri="{28A0092B-C50C-407E-A947-70E740481C1C}">
+                <a14:useLocalDpi xmlns:a14="http://schemas.microsoft.com/office/drawing/2010/main" val="0"/>
+              </a:ext>
+            </a:extLst>
+          </a:blip>
+          <a:srcRect/>
+          <a:stretch/>
+        </p:blipFill>
+        <p:spPr>
+          <a:xfrm>
+            <a:off x="-26242" y="-42972"/>
+            <a:ext cx="12244485" cy="6887522"/>
+          </a:xfrm>
+          <a:prstGeom prst="rect">
+            <a:avLst/>
+          </a:prstGeom>
+        </p:spPr>
+      </p:pic>
+      <p:sp>
+        <p:nvSpPr>
+          <p:cNvPr id="2" name="Retângulo 1"/>
+          <p:cNvSpPr/>
+          <p:nvPr/>
+        </p:nvSpPr>
+        <p:spPr>
+          <a:xfrm>
+            <a:off x="1629295" y="881149"/>
+            <a:ext cx="9127374" cy="5029200"/>
+          </a:xfrm>
+          <a:prstGeom prst="rect">
+            <a:avLst/>
+          </a:prstGeom>
+          <a:solidFill>
+            <a:schemeClr val="bg1">
+              <a:lumMod val="95000"/>
+            </a:schemeClr>
+          </a:solidFill>
+          <a:ln>
+            <a:noFill/>
+          </a:ln>
+        </p:spPr>
+        <p:style>
+          <a:lnRef idx="2">
+            <a:schemeClr val="accent1">
+              <a:shade val="50000"/>
+            </a:schemeClr>
+          </a:lnRef>
+          <a:fillRef idx="1">
+            <a:schemeClr val="accent1"/>
+          </a:fillRef>
+          <a:effectRef idx="0">
+            <a:schemeClr val="accent1"/>
+          </a:effectRef>
+          <a:fontRef idx="minor">
+            <a:schemeClr val="lt1"/>
+          </a:fontRef>
+        </p:style>
+        <p:txBody>
+          <a:bodyPr rtlCol="0" anchor="ctr"/>
+          <a:lstStyle/>
+          <a:p>
+            <a:pPr algn="ctr"/>
+            <a:r>
+              <a:rPr lang="pt-BR" dirty="0" smtClean="0">
+                <a:ln w="0"/>
+                <a:solidFill>
+                  <a:schemeClr val="tx1"/>
+                </a:solidFill>
+                <a:effectLst>
+                  <a:outerShdw blurRad="38100" dist="19050" dir="2700000" algn="tl" rotWithShape="0">
+                    <a:schemeClr val="dk1">
+                      <a:alpha val="40000"/>
+                    </a:schemeClr>
+                  </a:outerShdw>
+                </a:effectLst>
+              </a:rPr>
+              <a:t>Agora na prática.</a:t>
+            </a:r>
+            <a:endParaRPr lang="pt-BR" dirty="0"/>
+          </a:p>
+        </p:txBody>
+      </p:sp>
+    </p:spTree>
+    <p:extLst>
+      <p:ext uri="{BB962C8B-B14F-4D97-AF65-F5344CB8AC3E}">
+        <p14:creationId xmlns:p14="http://schemas.microsoft.com/office/powerpoint/2010/main" val="285138352"/>
       </p:ext>
     </p:extLst>
   </p:cSld>
@@ -3558,7 +4039,7 @@
         <p:spPr>
           <a:xfrm>
             <a:off x="3495413" y="444617"/>
-            <a:ext cx="3582099" cy="400110"/>
+            <a:ext cx="5800987" cy="400110"/>
           </a:xfrm>
           <a:prstGeom prst="rect">
             <a:avLst/>
@@ -3576,7 +4057,7 @@
                 <a:latin typeface="Gotham Book" pitchFamily="2" charset="0"/>
                 <a:cs typeface="Gotham Bold" pitchFamily="2" charset="0"/>
               </a:rPr>
-              <a:t>Base do Projeto</a:t>
+              <a:t>Características Gerais do Projeto</a:t>
             </a:r>
             <a:endParaRPr lang="pt-BR" sz="2000" b="1" dirty="0">
               <a:latin typeface="Gotham Bold" pitchFamily="2" charset="0"/>
@@ -3599,8 +4080,8 @@
         </p:nvSpPr>
         <p:spPr>
           <a:xfrm>
-            <a:off x="3495413" y="1873956"/>
-            <a:ext cx="5201174" cy="1708160"/>
+            <a:off x="3495413" y="1350081"/>
+            <a:ext cx="5201174" cy="2400657"/>
           </a:xfrm>
           <a:prstGeom prst="rect">
             <a:avLst/>
@@ -3614,11 +4095,43 @@
           <a:lstStyle/>
           <a:p>
             <a:r>
+              <a:rPr lang="pt-BR" sz="1500" dirty="0">
+                <a:solidFill>
+                  <a:srgbClr val="00B0F0"/>
+                </a:solidFill>
+                <a:latin typeface="Gotham Book" pitchFamily="2" charset="0"/>
+                <a:cs typeface="Gotham Book" pitchFamily="2" charset="0"/>
+              </a:rPr>
+              <a:t>https://github.com/JdSeus/UCPEL_PI8</a:t>
+            </a:r>
+            <a:endParaRPr lang="pt-BR" sz="1500" dirty="0" smtClean="0">
+              <a:solidFill>
+                <a:srgbClr val="00B0F0"/>
+              </a:solidFill>
+              <a:latin typeface="Gotham Book" pitchFamily="2" charset="0"/>
+              <a:cs typeface="Gotham Book" pitchFamily="2" charset="0"/>
+            </a:endParaRPr>
+          </a:p>
+          <a:p>
+            <a:endParaRPr lang="pt-BR" sz="1500" dirty="0">
+              <a:latin typeface="Gotham Book" pitchFamily="2" charset="0"/>
+              <a:cs typeface="Gotham Book" pitchFamily="2" charset="0"/>
+            </a:endParaRPr>
+          </a:p>
+          <a:p>
+            <a:r>
               <a:rPr lang="pt-BR" sz="1500" dirty="0" smtClean="0">
                 <a:latin typeface="Gotham Book" pitchFamily="2" charset="0"/>
                 <a:cs typeface="Gotham Book" pitchFamily="2" charset="0"/>
               </a:rPr>
-              <a:t>O projeto foi desenvolvido utilizando Node </a:t>
+              <a:t>O </a:t>
+            </a:r>
+            <a:r>
+              <a:rPr lang="pt-BR" sz="1500" dirty="0" smtClean="0">
+                <a:latin typeface="Gotham Book" pitchFamily="2" charset="0"/>
+                <a:cs typeface="Gotham Book" pitchFamily="2" charset="0"/>
+              </a:rPr>
+              <a:t>projeto foi desenvolvido utilizando Node </a:t>
             </a:r>
             <a:r>
               <a:rPr lang="pt-BR" sz="1500" dirty="0" err="1" smtClean="0">
@@ -3632,7 +4145,7 @@
                 <a:latin typeface="Gotham Book" pitchFamily="2" charset="0"/>
                 <a:cs typeface="Gotham Book" pitchFamily="2" charset="0"/>
               </a:rPr>
-              <a:t>. </a:t>
+              <a:t>.</a:t>
             </a:r>
           </a:p>
           <a:p>
@@ -3641,76 +4154,7 @@
                 <a:latin typeface="Gotham Book" pitchFamily="2" charset="0"/>
                 <a:cs typeface="Gotham Book" pitchFamily="2" charset="0"/>
               </a:rPr>
-              <a:t>As bibliotecas utilizadas foram:</a:t>
-            </a:r>
-          </a:p>
-          <a:p>
-            <a:r>
-              <a:rPr lang="pt-BR" sz="1500" dirty="0" smtClean="0">
-                <a:latin typeface="Gotham Book" pitchFamily="2" charset="0"/>
-                <a:cs typeface="Gotham Book" pitchFamily="2" charset="0"/>
-              </a:rPr>
-              <a:t>*</a:t>
-            </a:r>
-            <a:r>
-              <a:rPr lang="pt-BR" sz="1500" dirty="0" err="1" smtClean="0">
-                <a:latin typeface="Gotham Book" pitchFamily="2" charset="0"/>
-                <a:cs typeface="Gotham Book" pitchFamily="2" charset="0"/>
-              </a:rPr>
-              <a:t>body-parser</a:t>
-            </a:r>
-            <a:r>
-              <a:rPr lang="pt-BR" sz="1500" dirty="0" smtClean="0">
-                <a:latin typeface="Gotham Book" pitchFamily="2" charset="0"/>
-                <a:cs typeface="Gotham Book" pitchFamily="2" charset="0"/>
-              </a:rPr>
-              <a:t>;</a:t>
-            </a:r>
-          </a:p>
-          <a:p>
-            <a:r>
-              <a:rPr lang="pt-BR" sz="1500" dirty="0" smtClean="0">
-                <a:latin typeface="Gotham Book" pitchFamily="2" charset="0"/>
-                <a:cs typeface="Gotham Book" pitchFamily="2" charset="0"/>
-              </a:rPr>
-              <a:t>*</a:t>
-            </a:r>
-            <a:r>
-              <a:rPr lang="pt-BR" sz="1500" dirty="0" err="1" smtClean="0">
-                <a:latin typeface="Gotham Book" pitchFamily="2" charset="0"/>
-                <a:cs typeface="Gotham Book" pitchFamily="2" charset="0"/>
-              </a:rPr>
-              <a:t>celebrate</a:t>
-            </a:r>
-            <a:r>
-              <a:rPr lang="pt-BR" sz="1500" dirty="0" smtClean="0">
-                <a:latin typeface="Gotham Book" pitchFamily="2" charset="0"/>
-                <a:cs typeface="Gotham Book" pitchFamily="2" charset="0"/>
-              </a:rPr>
-              <a:t>;</a:t>
-            </a:r>
-          </a:p>
-          <a:p>
-            <a:r>
-              <a:rPr lang="pt-BR" sz="1500" dirty="0" smtClean="0">
-                <a:latin typeface="Gotham Book" pitchFamily="2" charset="0"/>
-                <a:cs typeface="Gotham Book" pitchFamily="2" charset="0"/>
-              </a:rPr>
-              <a:t>*</a:t>
-            </a:r>
-            <a:r>
-              <a:rPr lang="pt-BR" sz="1500" dirty="0" err="1" smtClean="0">
-                <a:latin typeface="Gotham Book" pitchFamily="2" charset="0"/>
-                <a:cs typeface="Gotham Book" pitchFamily="2" charset="0"/>
-              </a:rPr>
-              <a:t>express</a:t>
-            </a:r>
-            <a:r>
-              <a:rPr lang="pt-BR" sz="1500" dirty="0" smtClean="0">
-                <a:latin typeface="Gotham Book" pitchFamily="2" charset="0"/>
-                <a:cs typeface="Gotham Book" pitchFamily="2" charset="0"/>
-              </a:rPr>
-              <a:t>;</a:t>
+              <a:t> </a:t>
             </a:r>
             <a:endParaRPr lang="pt-BR" sz="1500" dirty="0" smtClean="0">
               <a:latin typeface="Gotham Book" pitchFamily="2" charset="0"/>
@@ -3718,6 +4162,75 @@
             </a:endParaRPr>
           </a:p>
           <a:p>
+            <a:r>
+              <a:rPr lang="pt-BR" sz="1500" dirty="0" smtClean="0">
+                <a:latin typeface="Gotham Book" pitchFamily="2" charset="0"/>
+                <a:cs typeface="Gotham Book" pitchFamily="2" charset="0"/>
+              </a:rPr>
+              <a:t>As bibliotecas utilizadas foram:</a:t>
+            </a:r>
+          </a:p>
+          <a:p>
+            <a:pPr marL="285750" indent="-285750">
+              <a:buFont typeface="Arial" panose="020B0604020202020204" pitchFamily="34" charset="0"/>
+              <a:buChar char="•"/>
+            </a:pPr>
+            <a:r>
+              <a:rPr lang="pt-BR" sz="1500" dirty="0" err="1" smtClean="0">
+                <a:latin typeface="Gotham Book" pitchFamily="2" charset="0"/>
+                <a:cs typeface="Gotham Book" pitchFamily="2" charset="0"/>
+              </a:rPr>
+              <a:t>body-parser</a:t>
+            </a:r>
+            <a:r>
+              <a:rPr lang="pt-BR" sz="1500" dirty="0" smtClean="0">
+                <a:latin typeface="Gotham Book" pitchFamily="2" charset="0"/>
+                <a:cs typeface="Gotham Book" pitchFamily="2" charset="0"/>
+              </a:rPr>
+              <a:t>;</a:t>
+            </a:r>
+          </a:p>
+          <a:p>
+            <a:pPr marL="285750" indent="-285750">
+              <a:buFont typeface="Arial" panose="020B0604020202020204" pitchFamily="34" charset="0"/>
+              <a:buChar char="•"/>
+            </a:pPr>
+            <a:r>
+              <a:rPr lang="pt-BR" sz="1500" dirty="0" err="1" smtClean="0">
+                <a:latin typeface="Gotham Book" pitchFamily="2" charset="0"/>
+                <a:cs typeface="Gotham Book" pitchFamily="2" charset="0"/>
+              </a:rPr>
+              <a:t>celebrate</a:t>
+            </a:r>
+            <a:r>
+              <a:rPr lang="pt-BR" sz="1500" dirty="0" smtClean="0">
+                <a:latin typeface="Gotham Book" pitchFamily="2" charset="0"/>
+                <a:cs typeface="Gotham Book" pitchFamily="2" charset="0"/>
+              </a:rPr>
+              <a:t>;</a:t>
+            </a:r>
+          </a:p>
+          <a:p>
+            <a:pPr marL="285750" indent="-285750">
+              <a:buFont typeface="Arial" panose="020B0604020202020204" pitchFamily="34" charset="0"/>
+              <a:buChar char="•"/>
+            </a:pPr>
+            <a:r>
+              <a:rPr lang="pt-BR" sz="1500" dirty="0" err="1" smtClean="0">
+                <a:latin typeface="Gotham Book" pitchFamily="2" charset="0"/>
+                <a:cs typeface="Gotham Book" pitchFamily="2" charset="0"/>
+              </a:rPr>
+              <a:t>express</a:t>
+            </a:r>
+            <a:r>
+              <a:rPr lang="pt-BR" sz="1500" dirty="0" smtClean="0">
+                <a:latin typeface="Gotham Book" pitchFamily="2" charset="0"/>
+                <a:cs typeface="Gotham Book" pitchFamily="2" charset="0"/>
+              </a:rPr>
+              <a:t>;</a:t>
+            </a:r>
+          </a:p>
+          <a:p>
             <a:endParaRPr lang="pt-BR" sz="1500" i="1" dirty="0">
               <a:latin typeface="Gotham Book" pitchFamily="2" charset="0"/>
               <a:cs typeface="Gotham Book" pitchFamily="2" charset="0"/>
@@ -3731,6 +4244,30 @@
           </a:p>
         </p:txBody>
       </p:sp>
+      <p:pic>
+        <p:nvPicPr>
+          <p:cNvPr id="4" name="Imagem 3"/>
+          <p:cNvPicPr>
+            <a:picLocks noChangeAspect="1"/>
+          </p:cNvPicPr>
+          <p:nvPr/>
+        </p:nvPicPr>
+        <p:blipFill>
+          <a:blip r:embed="rId2"/>
+          <a:stretch>
+            <a:fillRect/>
+          </a:stretch>
+        </p:blipFill>
+        <p:spPr>
+          <a:xfrm>
+            <a:off x="3562087" y="3644669"/>
+            <a:ext cx="5019937" cy="2905836"/>
+          </a:xfrm>
+          <a:prstGeom prst="rect">
+            <a:avLst/>
+          </a:prstGeom>
+        </p:spPr>
+      </p:pic>
     </p:spTree>
     <p:extLst>
       <p:ext uri="{BB962C8B-B14F-4D97-AF65-F5344CB8AC3E}">
@@ -3828,7 +4365,7 @@
         <p:spPr>
           <a:xfrm>
             <a:off x="6553200" y="959026"/>
-            <a:ext cx="4533900" cy="4847481"/>
+            <a:ext cx="4533900" cy="4832092"/>
           </a:xfrm>
           <a:prstGeom prst="rect">
             <a:avLst/>
@@ -3893,6 +4430,12 @@
             </a:r>
           </a:p>
           <a:p>
+            <a:endParaRPr lang="pt-BR" sz="1500" dirty="0" smtClean="0">
+              <a:latin typeface="Gotham Book" pitchFamily="2" charset="0"/>
+              <a:cs typeface="Gotham Book" pitchFamily="2" charset="0"/>
+            </a:endParaRPr>
+          </a:p>
+          <a:p>
             <a:endParaRPr lang="pt-BR" sz="1500" dirty="0">
               <a:latin typeface="Gotham Book" pitchFamily="2" charset="0"/>
               <a:cs typeface="Gotham Book" pitchFamily="2" charset="0"/>
@@ -3900,8 +4443,7 @@
           </a:p>
           <a:p>
             <a:r>
-              <a:rPr lang="pt-BR" sz="1500" dirty="0" smtClean="0">
-                <a:latin typeface="Gotham Book" pitchFamily="2" charset="0"/>
+              <a:rPr lang="pt-BR" sz="1400" dirty="0" smtClean="0">
                 <a:cs typeface="Gotham Book" pitchFamily="2" charset="0"/>
               </a:rPr>
               <a:t>O id é do tipo inteiro.</a:t>
@@ -3909,22 +4451,19 @@
           </a:p>
           <a:p>
             <a:r>
-              <a:rPr lang="pt-BR" sz="1500" dirty="0" smtClean="0">
-                <a:latin typeface="Gotham Book" pitchFamily="2" charset="0"/>
+              <a:rPr lang="pt-BR" sz="1400" dirty="0" smtClean="0">
                 <a:cs typeface="Gotham Book" pitchFamily="2" charset="0"/>
               </a:rPr>
               <a:t>O nome é uma </a:t>
             </a:r>
             <a:r>
-              <a:rPr lang="pt-BR" sz="1500" dirty="0" err="1" smtClean="0">
-                <a:latin typeface="Gotham Book" pitchFamily="2" charset="0"/>
+              <a:rPr lang="pt-BR" sz="1400" dirty="0" err="1" smtClean="0">
                 <a:cs typeface="Gotham Book" pitchFamily="2" charset="0"/>
               </a:rPr>
               <a:t>string</a:t>
             </a:r>
             <a:r>
-              <a:rPr lang="pt-BR" sz="1500" dirty="0" smtClean="0">
-                <a:latin typeface="Gotham Book" pitchFamily="2" charset="0"/>
+              <a:rPr lang="pt-BR" sz="1400" dirty="0" smtClean="0">
                 <a:cs typeface="Gotham Book" pitchFamily="2" charset="0"/>
               </a:rPr>
               <a:t>.</a:t>
@@ -3932,22 +4471,19 @@
           </a:p>
           <a:p>
             <a:r>
-              <a:rPr lang="pt-BR" sz="1500" dirty="0" smtClean="0">
-                <a:latin typeface="Gotham Book" pitchFamily="2" charset="0"/>
+              <a:rPr lang="pt-BR" sz="1400" dirty="0" smtClean="0">
                 <a:cs typeface="Gotham Book" pitchFamily="2" charset="0"/>
               </a:rPr>
               <a:t>O endereço é uma </a:t>
             </a:r>
             <a:r>
-              <a:rPr lang="pt-BR" sz="1500" dirty="0" err="1" smtClean="0">
-                <a:latin typeface="Gotham Book" pitchFamily="2" charset="0"/>
+              <a:rPr lang="pt-BR" sz="1400" dirty="0" err="1" smtClean="0">
                 <a:cs typeface="Gotham Book" pitchFamily="2" charset="0"/>
               </a:rPr>
               <a:t>string</a:t>
             </a:r>
             <a:r>
-              <a:rPr lang="pt-BR" sz="1500" dirty="0" smtClean="0">
-                <a:latin typeface="Gotham Book" pitchFamily="2" charset="0"/>
+              <a:rPr lang="pt-BR" sz="1400" dirty="0" smtClean="0">
                 <a:cs typeface="Gotham Book" pitchFamily="2" charset="0"/>
               </a:rPr>
               <a:t>.</a:t>
@@ -3955,36 +4491,31 @@
           </a:p>
           <a:p>
             <a:r>
-              <a:rPr lang="pt-BR" sz="1500" dirty="0" smtClean="0">
-                <a:latin typeface="Gotham Book" pitchFamily="2" charset="0"/>
+              <a:rPr lang="pt-BR" sz="1400" dirty="0" smtClean="0">
                 <a:cs typeface="Gotham Book" pitchFamily="2" charset="0"/>
               </a:rPr>
               <a:t>O </a:t>
             </a:r>
             <a:r>
-              <a:rPr lang="pt-BR" sz="1500" dirty="0" err="1" smtClean="0">
-                <a:latin typeface="Gotham Book" pitchFamily="2" charset="0"/>
+              <a:rPr lang="pt-BR" sz="1400" dirty="0" err="1" smtClean="0">
                 <a:cs typeface="Gotham Book" pitchFamily="2" charset="0"/>
               </a:rPr>
               <a:t>cep</a:t>
             </a:r>
             <a:r>
-              <a:rPr lang="pt-BR" sz="1500" dirty="0" smtClean="0">
-                <a:latin typeface="Gotham Book" pitchFamily="2" charset="0"/>
+              <a:rPr lang="pt-BR" sz="1400" dirty="0" smtClean="0">
                 <a:cs typeface="Gotham Book" pitchFamily="2" charset="0"/>
               </a:rPr>
               <a:t> é uma </a:t>
             </a:r>
             <a:r>
-              <a:rPr lang="pt-BR" sz="1500" dirty="0" err="1" smtClean="0">
-                <a:latin typeface="Gotham Book" pitchFamily="2" charset="0"/>
+              <a:rPr lang="pt-BR" sz="1400" dirty="0" err="1" smtClean="0">
                 <a:cs typeface="Gotham Book" pitchFamily="2" charset="0"/>
               </a:rPr>
               <a:t>string</a:t>
             </a:r>
             <a:r>
-              <a:rPr lang="pt-BR" sz="1500" dirty="0" smtClean="0">
-                <a:latin typeface="Gotham Book" pitchFamily="2" charset="0"/>
+              <a:rPr lang="pt-BR" sz="1400" dirty="0" smtClean="0">
                 <a:cs typeface="Gotham Book" pitchFamily="2" charset="0"/>
               </a:rPr>
               <a:t>;</a:t>
@@ -3992,24 +4523,24 @@
           </a:p>
           <a:p>
             <a:r>
-              <a:rPr lang="pt-BR" dirty="0" smtClean="0"/>
+              <a:rPr lang="pt-BR" sz="1400" dirty="0" smtClean="0"/>
               <a:t>A data de nascimento é uma </a:t>
             </a:r>
             <a:r>
-              <a:rPr lang="pt-BR" dirty="0" err="1" smtClean="0"/>
+              <a:rPr lang="pt-BR" sz="1400" dirty="0" err="1" smtClean="0"/>
               <a:t>string</a:t>
             </a:r>
             <a:r>
-              <a:rPr lang="pt-BR" dirty="0" smtClean="0"/>
+              <a:rPr lang="pt-BR" sz="1400" dirty="0" smtClean="0"/>
               <a:t> de data seguindo o padrão ISO 8601.</a:t>
             </a:r>
           </a:p>
           <a:p>
             <a:r>
-              <a:rPr lang="pt-BR" dirty="0" smtClean="0"/>
+              <a:rPr lang="pt-BR" sz="1400" dirty="0" smtClean="0"/>
               <a:t>O telefone é um inteiro.</a:t>
             </a:r>
-            <a:endParaRPr lang="pt-BR" dirty="0"/>
+            <a:endParaRPr lang="pt-BR" sz="1400" dirty="0"/>
           </a:p>
           <a:p>
             <a:endParaRPr lang="pt-BR" sz="1500" dirty="0" smtClean="0">
@@ -4177,7 +4708,14 @@
                 <a:latin typeface="Gotham Book" pitchFamily="2" charset="0"/>
                 <a:cs typeface="Gotham Book" pitchFamily="2" charset="0"/>
               </a:rPr>
-              <a:t>, dado que o consumidor recebe um JSON com a resposta de sua requisição e esta arquitetura refletiu na estrutura de pastas.</a:t>
+              <a:t>, dado que o consumidor recebe um JSON com a resposta de sua </a:t>
+            </a:r>
+            <a:r>
+              <a:rPr lang="pt-BR" sz="1500" dirty="0" smtClean="0">
+                <a:latin typeface="Gotham Book" pitchFamily="2" charset="0"/>
+                <a:cs typeface="Gotham Book" pitchFamily="2" charset="0"/>
+              </a:rPr>
+              <a:t>requisição.</a:t>
             </a:r>
           </a:p>
           <a:p>
@@ -4306,8 +4844,19 @@
                 <a:latin typeface="Gotham Book" pitchFamily="2" charset="0"/>
                 <a:cs typeface="Gotham Book" pitchFamily="2" charset="0"/>
               </a:rPr>
-              <a:t>, que é o arquivo de rotas as rotas.</a:t>
-            </a:r>
+              <a:t>, que é o arquivo de </a:t>
+            </a:r>
+            <a:r>
+              <a:rPr lang="pt-BR" sz="1500" dirty="0" smtClean="0">
+                <a:latin typeface="Gotham Book" pitchFamily="2" charset="0"/>
+                <a:cs typeface="Gotham Book" pitchFamily="2" charset="0"/>
+              </a:rPr>
+              <a:t>rotas.</a:t>
+            </a:r>
+            <a:endParaRPr lang="pt-BR" sz="1500" dirty="0" smtClean="0">
+              <a:latin typeface="Gotham Book" pitchFamily="2" charset="0"/>
+              <a:cs typeface="Gotham Book" pitchFamily="2" charset="0"/>
+            </a:endParaRPr>
           </a:p>
           <a:p>
             <a:endParaRPr lang="pt-BR" sz="1500" dirty="0">
@@ -4440,8 +4989,8 @@
         </p:nvSpPr>
         <p:spPr>
           <a:xfrm>
-            <a:off x="3495413" y="444617"/>
-            <a:ext cx="3582099" cy="707886"/>
+            <a:off x="5133713" y="497957"/>
+            <a:ext cx="3582099" cy="400110"/>
           </a:xfrm>
           <a:prstGeom prst="rect">
             <a:avLst/>
@@ -4459,7 +5008,7 @@
                 <a:latin typeface="Gotham Book" pitchFamily="2" charset="0"/>
                 <a:cs typeface="Gotham Book" pitchFamily="2" charset="0"/>
               </a:rPr>
-              <a:t>Um pouco das bibliotecas utilizadas no node.js</a:t>
+              <a:t>Algumas Considerações</a:t>
             </a:r>
             <a:endParaRPr lang="pt-BR" sz="2000" b="1" dirty="0">
               <a:latin typeface="Gotham Bold" pitchFamily="2" charset="0"/>
@@ -4482,8 +5031,8 @@
         </p:nvSpPr>
         <p:spPr>
           <a:xfrm>
-            <a:off x="3495413" y="1712031"/>
-            <a:ext cx="5201174" cy="2400657"/>
+            <a:off x="5286462" y="1280159"/>
+            <a:ext cx="5201174" cy="1246495"/>
           </a:xfrm>
           <a:prstGeom prst="rect">
             <a:avLst/>
@@ -4497,96 +5046,47 @@
           <a:lstStyle/>
           <a:p>
             <a:r>
-              <a:rPr lang="pt-BR" sz="1500" b="1" dirty="0" smtClean="0">
-                <a:latin typeface="Gotham Book" pitchFamily="2" charset="0"/>
-                <a:cs typeface="Gotham Book" pitchFamily="2" charset="0"/>
-              </a:rPr>
-              <a:t>EXPRESS</a:t>
-            </a:r>
-            <a:br>
-              <a:rPr lang="pt-BR" sz="1500" b="1" dirty="0" smtClean="0">
-                <a:latin typeface="Gotham Book" pitchFamily="2" charset="0"/>
-                <a:cs typeface="Gotham Book" pitchFamily="2" charset="0"/>
-              </a:rPr>
-            </a:br>
-            <a:endParaRPr lang="pt-BR" sz="1500" b="1" dirty="0" smtClean="0">
-              <a:latin typeface="Gotham Book" pitchFamily="2" charset="0"/>
-              <a:cs typeface="Gotham Book" pitchFamily="2" charset="0"/>
-            </a:endParaRPr>
-          </a:p>
-          <a:p>
-            <a:r>
               <a:rPr lang="pt-BR" sz="1500" dirty="0" smtClean="0">
                 <a:latin typeface="Gotham Book" pitchFamily="2" charset="0"/>
                 <a:cs typeface="Gotham Book" pitchFamily="2" charset="0"/>
               </a:rPr>
-              <a:t>O Express.js é um framework que fornece os recursos mínimos para a construção de servidores web.</a:t>
-            </a:r>
-          </a:p>
-          <a:p>
-            <a:r>
-              <a:rPr lang="pt-BR" sz="1500" b="1" dirty="0" smtClean="0">
-                <a:latin typeface="Gotham Book" pitchFamily="2" charset="0"/>
-                <a:cs typeface="Gotham Book" pitchFamily="2" charset="0"/>
-              </a:rPr>
-              <a:t/>
-            </a:r>
-            <a:br>
-              <a:rPr lang="pt-BR" sz="1500" b="1" dirty="0" smtClean="0">
-                <a:latin typeface="Gotham Book" pitchFamily="2" charset="0"/>
-                <a:cs typeface="Gotham Book" pitchFamily="2" charset="0"/>
-              </a:rPr>
-            </a:br>
-            <a:r>
-              <a:rPr lang="pt-BR" sz="1500" dirty="0" smtClean="0">
-                <a:latin typeface="Gotham Book" pitchFamily="2" charset="0"/>
-                <a:cs typeface="Gotham Book" pitchFamily="2" charset="0"/>
-              </a:rPr>
-              <a:t>Foi nele que foi configurada as rotas, tratamentos de erros e etc. </a:t>
-            </a:r>
-            <a:br>
-              <a:rPr lang="pt-BR" sz="1500" dirty="0" smtClean="0">
-                <a:latin typeface="Gotham Book" pitchFamily="2" charset="0"/>
-                <a:cs typeface="Gotham Book" pitchFamily="2" charset="0"/>
-              </a:rPr>
-            </a:br>
-            <a:r>
-              <a:rPr lang="pt-BR" sz="1500" dirty="0" smtClean="0">
-                <a:latin typeface="Gotham Book" pitchFamily="2" charset="0"/>
-                <a:cs typeface="Gotham Book" pitchFamily="2" charset="0"/>
-              </a:rPr>
-              <a:t/>
-            </a:r>
-            <a:br>
-              <a:rPr lang="pt-BR" sz="1500" dirty="0" smtClean="0">
-                <a:latin typeface="Gotham Book" pitchFamily="2" charset="0"/>
-                <a:cs typeface="Gotham Book" pitchFamily="2" charset="0"/>
-              </a:rPr>
-            </a:br>
-            <a:r>
-              <a:rPr lang="pt-BR" sz="1500" dirty="0" smtClean="0">
-                <a:latin typeface="Gotham Book" pitchFamily="2" charset="0"/>
-                <a:cs typeface="Gotham Book" pitchFamily="2" charset="0"/>
-              </a:rPr>
-              <a:t>Foi a base para a construção do projeto.</a:t>
-            </a:r>
-            <a:endParaRPr lang="pt-BR" sz="1500" b="1" i="1" dirty="0">
-              <a:latin typeface="Gotham Book" pitchFamily="2" charset="0"/>
-              <a:cs typeface="Gotham Book" pitchFamily="2" charset="0"/>
-            </a:endParaRPr>
-          </a:p>
-          <a:p>
+              <a:t>Métodos PUT e PATCH</a:t>
+            </a:r>
             <a:endParaRPr lang="pt-BR" sz="1500" dirty="0">
               <a:latin typeface="Gotham Book" pitchFamily="2" charset="0"/>
               <a:cs typeface="Gotham Book" pitchFamily="2" charset="0"/>
             </a:endParaRPr>
           </a:p>
+          <a:p>
+            <a:endParaRPr lang="pt-BR" sz="1500" dirty="0" smtClean="0">
+              <a:latin typeface="Gotham Book" pitchFamily="2" charset="0"/>
+              <a:cs typeface="Gotham Book" pitchFamily="2" charset="0"/>
+            </a:endParaRPr>
+          </a:p>
+          <a:p>
+            <a:endParaRPr lang="pt-BR" sz="1500" i="1" dirty="0">
+              <a:latin typeface="Gotham Book" pitchFamily="2" charset="0"/>
+              <a:cs typeface="Gotham Book" pitchFamily="2" charset="0"/>
+            </a:endParaRPr>
+          </a:p>
+          <a:p>
+            <a:endParaRPr lang="pt-BR" sz="1500" i="1" dirty="0">
+              <a:latin typeface="Gotham Book" pitchFamily="2" charset="0"/>
+              <a:cs typeface="Gotham Book" pitchFamily="2" charset="0"/>
+            </a:endParaRPr>
+          </a:p>
+          <a:p>
+            <a:endParaRPr lang="pt-BR" sz="1500" dirty="0">
+              <a:latin typeface="Gotham Book" pitchFamily="2" charset="0"/>
+              <a:cs typeface="Gotham Book" pitchFamily="2" charset="0"/>
+            </a:endParaRPr>
+          </a:p>
         </p:txBody>
       </p:sp>
     </p:spTree>
     <p:extLst>
       <p:ext uri="{BB962C8B-B14F-4D97-AF65-F5344CB8AC3E}">
-        <p14:creationId xmlns:p14="http://schemas.microsoft.com/office/powerpoint/2010/main" val="536419938"/>
+        <p14:creationId xmlns:p14="http://schemas.microsoft.com/office/powerpoint/2010/main" val="3793650695"/>
       </p:ext>
     </p:extLst>
   </p:cSld>
@@ -4630,8 +5130,8 @@
         </p:nvSpPr>
         <p:spPr>
           <a:xfrm>
-            <a:off x="3495413" y="444617"/>
-            <a:ext cx="3582099" cy="707886"/>
+            <a:off x="3765666" y="556146"/>
+            <a:ext cx="6084916" cy="400110"/>
           </a:xfrm>
           <a:prstGeom prst="rect">
             <a:avLst/>
@@ -4644,12 +5144,13 @@
           </a:bodyPr>
           <a:lstStyle/>
           <a:p>
+            <a:pPr algn="ctr"/>
             <a:r>
               <a:rPr lang="pt-BR" sz="2000" b="1" dirty="0" smtClean="0">
                 <a:latin typeface="Gotham Book" pitchFamily="2" charset="0"/>
                 <a:cs typeface="Gotham Book" pitchFamily="2" charset="0"/>
               </a:rPr>
-              <a:t>Um pouco das bibliotecas utilizadas no node.js</a:t>
+              <a:t>Arquivo server.js e instruções</a:t>
             </a:r>
             <a:endParaRPr lang="pt-BR" sz="2000" b="1" dirty="0">
               <a:latin typeface="Gotham Bold" pitchFamily="2" charset="0"/>
@@ -4672,8 +5173,8 @@
         </p:nvSpPr>
         <p:spPr>
           <a:xfrm>
-            <a:off x="3495413" y="1712031"/>
-            <a:ext cx="5201174" cy="1708160"/>
+            <a:off x="3868837" y="3191796"/>
+            <a:ext cx="6050368" cy="3093154"/>
           </a:xfrm>
           <a:prstGeom prst="rect">
             <a:avLst/>
@@ -4687,19 +5188,15 @@
           <a:lstStyle/>
           <a:p>
             <a:r>
-              <a:rPr lang="pt-BR" sz="1500" b="1" dirty="0" smtClean="0">
-                <a:latin typeface="Gotham Book" pitchFamily="2" charset="0"/>
-                <a:cs typeface="Gotham Book" pitchFamily="2" charset="0"/>
-              </a:rPr>
-              <a:t>BODY-PARSER</a:t>
-            </a:r>
-            <a:br>
-              <a:rPr lang="pt-BR" sz="1500" b="1" dirty="0" smtClean="0">
-                <a:latin typeface="Gotham Book" pitchFamily="2" charset="0"/>
-                <a:cs typeface="Gotham Book" pitchFamily="2" charset="0"/>
-              </a:rPr>
-            </a:br>
-            <a:endParaRPr lang="pt-BR" sz="1500" b="1" dirty="0" smtClean="0">
+              <a:rPr lang="pt-BR" sz="1500" dirty="0" smtClean="0">
+                <a:latin typeface="Gotham Book" pitchFamily="2" charset="0"/>
+                <a:cs typeface="Gotham Book" pitchFamily="2" charset="0"/>
+              </a:rPr>
+              <a:t>Por padrão, o projeto está utilizando a porta 8000.</a:t>
+            </a:r>
+          </a:p>
+          <a:p>
+            <a:endParaRPr lang="pt-BR" sz="1500" dirty="0">
               <a:latin typeface="Gotham Book" pitchFamily="2" charset="0"/>
               <a:cs typeface="Gotham Book" pitchFamily="2" charset="0"/>
             </a:endParaRPr>
@@ -4710,7 +5207,7 @@
                 <a:latin typeface="Gotham Book" pitchFamily="2" charset="0"/>
                 <a:cs typeface="Gotham Book" pitchFamily="2" charset="0"/>
               </a:rPr>
-              <a:t>É utilizado para limitar os tipos de requisições de entrada na aplicação. </a:t>
+              <a:t>Para servir o projeto, é necessário o node instalado no sistema. Com o Node instalado, é necessário realizar o comando:</a:t>
             </a:r>
           </a:p>
           <a:p>
@@ -4720,48 +5217,145 @@
             </a:endParaRPr>
           </a:p>
           <a:p>
+            <a:endParaRPr lang="pt-BR" sz="1500" dirty="0">
+              <a:latin typeface="Gotham Book" pitchFamily="2" charset="0"/>
+              <a:cs typeface="Gotham Book" pitchFamily="2" charset="0"/>
+            </a:endParaRPr>
+          </a:p>
+          <a:p>
+            <a:endParaRPr lang="pt-BR" sz="1500" dirty="0">
+              <a:latin typeface="Gotham Book" pitchFamily="2" charset="0"/>
+              <a:cs typeface="Gotham Book" pitchFamily="2" charset="0"/>
+            </a:endParaRPr>
+          </a:p>
+          <a:p>
             <a:r>
               <a:rPr lang="pt-BR" sz="1500" dirty="0" smtClean="0">
                 <a:latin typeface="Gotham Book" pitchFamily="2" charset="0"/>
                 <a:cs typeface="Gotham Book" pitchFamily="2" charset="0"/>
               </a:rPr>
-              <a:t>No caso, foi limitado para receber requisições </a:t>
-            </a:r>
-            <a:r>
-              <a:rPr lang="pt-BR" sz="1500" dirty="0" err="1" smtClean="0">
-                <a:latin typeface="Gotham Book" pitchFamily="2" charset="0"/>
-                <a:cs typeface="Gotham Book" pitchFamily="2" charset="0"/>
-              </a:rPr>
-              <a:t>json</a:t>
-            </a:r>
+              <a:t>Se tudo estiver certo, irá aparecer no console a seguinte mensagem:</a:t>
+            </a:r>
+            <a:endParaRPr lang="pt-BR" sz="1500" dirty="0" smtClean="0">
+              <a:latin typeface="Gotham Book" pitchFamily="2" charset="0"/>
+              <a:cs typeface="Gotham Book" pitchFamily="2" charset="0"/>
+            </a:endParaRPr>
+          </a:p>
+          <a:p>
+            <a:endParaRPr lang="pt-BR" sz="1500" i="1" dirty="0">
+              <a:latin typeface="Gotham Book" pitchFamily="2" charset="0"/>
+              <a:cs typeface="Gotham Book" pitchFamily="2" charset="0"/>
+            </a:endParaRPr>
+          </a:p>
+          <a:p>
+            <a:endParaRPr lang="pt-BR" sz="1500" i="1" dirty="0" smtClean="0">
+              <a:latin typeface="Gotham Book" pitchFamily="2" charset="0"/>
+              <a:cs typeface="Gotham Book" pitchFamily="2" charset="0"/>
+            </a:endParaRPr>
+          </a:p>
+          <a:p>
+            <a:endParaRPr lang="pt-BR" sz="1500" i="1" dirty="0">
+              <a:latin typeface="Gotham Book" pitchFamily="2" charset="0"/>
+              <a:cs typeface="Gotham Book" pitchFamily="2" charset="0"/>
+            </a:endParaRPr>
+          </a:p>
+          <a:p>
             <a:r>
               <a:rPr lang="pt-BR" sz="1500" dirty="0" smtClean="0">
                 <a:latin typeface="Gotham Book" pitchFamily="2" charset="0"/>
                 <a:cs typeface="Gotham Book" pitchFamily="2" charset="0"/>
               </a:rPr>
-              <a:t> e </a:t>
-            </a:r>
-            <a:r>
-              <a:rPr lang="pt-BR" sz="1500" dirty="0" err="1" smtClean="0">
-                <a:latin typeface="Gotham Book" pitchFamily="2" charset="0"/>
-                <a:cs typeface="Gotham Book" pitchFamily="2" charset="0"/>
-              </a:rPr>
-              <a:t>urlencoded</a:t>
-            </a:r>
-            <a:r>
-              <a:rPr lang="pt-BR" sz="1500" dirty="0" smtClean="0">
-                <a:latin typeface="Gotham Book" pitchFamily="2" charset="0"/>
-                <a:cs typeface="Gotham Book" pitchFamily="2" charset="0"/>
-              </a:rPr>
-              <a:t>.</a:t>
-            </a:r>
-          </a:p>
-        </p:txBody>
-      </p:sp>
+              <a:t>Com isso, já será possível realizar as requisições.</a:t>
+            </a:r>
+            <a:endParaRPr lang="pt-BR" sz="1500" dirty="0">
+              <a:latin typeface="Gotham Book" pitchFamily="2" charset="0"/>
+              <a:cs typeface="Gotham Book" pitchFamily="2" charset="0"/>
+            </a:endParaRPr>
+          </a:p>
+          <a:p>
+            <a:endParaRPr lang="pt-BR" sz="1500" dirty="0">
+              <a:latin typeface="Gotham Book" pitchFamily="2" charset="0"/>
+              <a:cs typeface="Gotham Book" pitchFamily="2" charset="0"/>
+            </a:endParaRPr>
+          </a:p>
+        </p:txBody>
+      </p:sp>
+      <p:pic>
+        <p:nvPicPr>
+          <p:cNvPr id="5" name="Imagem 4"/>
+          <p:cNvPicPr>
+            <a:picLocks noChangeAspect="1"/>
+          </p:cNvPicPr>
+          <p:nvPr/>
+        </p:nvPicPr>
+        <p:blipFill>
+          <a:blip r:embed="rId2"/>
+          <a:stretch>
+            <a:fillRect/>
+          </a:stretch>
+        </p:blipFill>
+        <p:spPr>
+          <a:xfrm>
+            <a:off x="4917584" y="1331076"/>
+            <a:ext cx="3952875" cy="1485900"/>
+          </a:xfrm>
+          <a:prstGeom prst="rect">
+            <a:avLst/>
+          </a:prstGeom>
+        </p:spPr>
+      </p:pic>
+      <p:pic>
+        <p:nvPicPr>
+          <p:cNvPr id="6" name="Imagem 5"/>
+          <p:cNvPicPr>
+            <a:picLocks noChangeAspect="1"/>
+          </p:cNvPicPr>
+          <p:nvPr/>
+        </p:nvPicPr>
+        <p:blipFill>
+          <a:blip r:embed="rId3"/>
+          <a:stretch>
+            <a:fillRect/>
+          </a:stretch>
+        </p:blipFill>
+        <p:spPr>
+          <a:xfrm>
+            <a:off x="3951143" y="4326585"/>
+            <a:ext cx="1803139" cy="278667"/>
+          </a:xfrm>
+          <a:prstGeom prst="rect">
+            <a:avLst/>
+          </a:prstGeom>
+        </p:spPr>
+      </p:pic>
+      <p:pic>
+        <p:nvPicPr>
+          <p:cNvPr id="7" name="Imagem 6"/>
+          <p:cNvPicPr>
+            <a:picLocks noChangeAspect="1"/>
+          </p:cNvPicPr>
+          <p:nvPr/>
+        </p:nvPicPr>
+        <p:blipFill>
+          <a:blip r:embed="rId4"/>
+          <a:stretch>
+            <a:fillRect/>
+          </a:stretch>
+        </p:blipFill>
+        <p:spPr>
+          <a:xfrm>
+            <a:off x="3951143" y="5210796"/>
+            <a:ext cx="4716265" cy="313113"/>
+          </a:xfrm>
+          <a:prstGeom prst="rect">
+            <a:avLst/>
+          </a:prstGeom>
+        </p:spPr>
+      </p:pic>
     </p:spTree>
     <p:extLst>
       <p:ext uri="{BB962C8B-B14F-4D97-AF65-F5344CB8AC3E}">
-        <p14:creationId xmlns:p14="http://schemas.microsoft.com/office/powerpoint/2010/main" val="920075433"/>
+        <p14:creationId xmlns:p14="http://schemas.microsoft.com/office/powerpoint/2010/main" val="93648696"/>
       </p:ext>
     </p:extLst>
   </p:cSld>
@@ -4805,8 +5399,8 @@
         </p:nvSpPr>
         <p:spPr>
           <a:xfrm>
-            <a:off x="3495413" y="444617"/>
-            <a:ext cx="3582099" cy="707886"/>
+            <a:off x="3765666" y="556146"/>
+            <a:ext cx="6084916" cy="400110"/>
           </a:xfrm>
           <a:prstGeom prst="rect">
             <a:avLst/>
@@ -4819,12 +5413,20 @@
           </a:bodyPr>
           <a:lstStyle/>
           <a:p>
+            <a:pPr algn="ctr"/>
             <a:r>
               <a:rPr lang="pt-BR" sz="2000" b="1" dirty="0" smtClean="0">
                 <a:latin typeface="Gotham Book" pitchFamily="2" charset="0"/>
                 <a:cs typeface="Gotham Book" pitchFamily="2" charset="0"/>
               </a:rPr>
-              <a:t>Um pouco das bibliotecas utilizadas no node.js</a:t>
+              <a:t>Para quem usa o </a:t>
+            </a:r>
+            <a:r>
+              <a:rPr lang="pt-BR" sz="2000" b="1" dirty="0" err="1" smtClean="0">
+                <a:latin typeface="Gotham Book" pitchFamily="2" charset="0"/>
+                <a:cs typeface="Gotham Book" pitchFamily="2" charset="0"/>
+              </a:rPr>
+              <a:t>Postman</a:t>
             </a:r>
             <a:endParaRPr lang="pt-BR" sz="2000" b="1" dirty="0">
               <a:latin typeface="Gotham Bold" pitchFamily="2" charset="0"/>
@@ -4833,10 +5435,118 @@
           </a:p>
         </p:txBody>
       </p:sp>
+      <p:sp>
+        <p:nvSpPr>
+          <p:cNvPr id="3" name="CaixaDeTexto 2">
+            <a:extLst>
+              <a:ext uri="{FF2B5EF4-FFF2-40B4-BE49-F238E27FC236}">
+                <a16:creationId xmlns:a16="http://schemas.microsoft.com/office/drawing/2014/main" id="{832FD19A-27D8-40DC-BF12-FE0103F089F5}"/>
+              </a:ext>
+            </a:extLst>
+          </p:cNvPr>
+          <p:cNvSpPr txBox="1"/>
+          <p:nvPr/>
+        </p:nvSpPr>
+        <p:spPr>
+          <a:xfrm>
+            <a:off x="3338512" y="4219575"/>
+            <a:ext cx="6050368" cy="784830"/>
+          </a:xfrm>
+          <a:prstGeom prst="rect">
+            <a:avLst/>
+          </a:prstGeom>
+          <a:noFill/>
+        </p:spPr>
+        <p:txBody>
+          <a:bodyPr wrap="square" rtlCol="0">
+            <a:spAutoFit/>
+          </a:bodyPr>
+          <a:lstStyle/>
+          <a:p>
+            <a:r>
+              <a:rPr lang="pt-BR" sz="1500" dirty="0" smtClean="0">
+                <a:latin typeface="Gotham Book" pitchFamily="2" charset="0"/>
+                <a:cs typeface="Gotham Book" pitchFamily="2" charset="0"/>
+              </a:rPr>
+              <a:t>No repositório do projeto está a </a:t>
+            </a:r>
+            <a:r>
+              <a:rPr lang="pt-BR" sz="1500" dirty="0" err="1" smtClean="0">
+                <a:latin typeface="Gotham Book" pitchFamily="2" charset="0"/>
+                <a:cs typeface="Gotham Book" pitchFamily="2" charset="0"/>
+              </a:rPr>
+              <a:t>postman</a:t>
+            </a:r>
+            <a:r>
+              <a:rPr lang="pt-BR" sz="1500" dirty="0" smtClean="0">
+                <a:latin typeface="Gotham Book" pitchFamily="2" charset="0"/>
+                <a:cs typeface="Gotham Book" pitchFamily="2" charset="0"/>
+              </a:rPr>
+              <a:t> </a:t>
+            </a:r>
+            <a:r>
+              <a:rPr lang="pt-BR" sz="1500" dirty="0" err="1" smtClean="0">
+                <a:latin typeface="Gotham Book" pitchFamily="2" charset="0"/>
+                <a:cs typeface="Gotham Book" pitchFamily="2" charset="0"/>
+              </a:rPr>
+              <a:t>collection</a:t>
+            </a:r>
+            <a:r>
+              <a:rPr lang="pt-BR" sz="1500" dirty="0" smtClean="0">
+                <a:latin typeface="Gotham Book" pitchFamily="2" charset="0"/>
+                <a:cs typeface="Gotham Book" pitchFamily="2" charset="0"/>
+              </a:rPr>
+              <a:t> exportada. De modo que para quem quiser testar a API é só importar ela no </a:t>
+            </a:r>
+            <a:r>
+              <a:rPr lang="pt-BR" sz="1500" dirty="0" err="1" smtClean="0">
+                <a:latin typeface="Gotham Book" pitchFamily="2" charset="0"/>
+                <a:cs typeface="Gotham Book" pitchFamily="2" charset="0"/>
+              </a:rPr>
+              <a:t>Postman</a:t>
+            </a:r>
+            <a:r>
+              <a:rPr lang="pt-BR" sz="1500" dirty="0" smtClean="0">
+                <a:latin typeface="Gotham Book" pitchFamily="2" charset="0"/>
+                <a:cs typeface="Gotham Book" pitchFamily="2" charset="0"/>
+              </a:rPr>
+              <a:t>. </a:t>
+            </a:r>
+            <a:endParaRPr lang="pt-BR" sz="1500" dirty="0">
+              <a:latin typeface="Gotham Book" pitchFamily="2" charset="0"/>
+              <a:cs typeface="Gotham Book" pitchFamily="2" charset="0"/>
+            </a:endParaRPr>
+          </a:p>
+        </p:txBody>
+      </p:sp>
+      <p:pic>
+        <p:nvPicPr>
+          <p:cNvPr id="9" name="Imagem 8"/>
+          <p:cNvPicPr>
+            <a:picLocks noChangeAspect="1"/>
+          </p:cNvPicPr>
+          <p:nvPr/>
+        </p:nvPicPr>
+        <p:blipFill>
+          <a:blip r:embed="rId2"/>
+          <a:stretch>
+            <a:fillRect/>
+          </a:stretch>
+        </p:blipFill>
+        <p:spPr>
+          <a:xfrm>
+            <a:off x="3338512" y="1209675"/>
+            <a:ext cx="6315075" cy="3009900"/>
+          </a:xfrm>
+          <a:prstGeom prst="rect">
+            <a:avLst/>
+          </a:prstGeom>
+        </p:spPr>
+      </p:pic>
     </p:spTree>
     <p:extLst>
       <p:ext uri="{BB962C8B-B14F-4D97-AF65-F5344CB8AC3E}">
-        <p14:creationId xmlns:p14="http://schemas.microsoft.com/office/powerpoint/2010/main" val="2323421084"/>
+        <p14:creationId xmlns:p14="http://schemas.microsoft.com/office/powerpoint/2010/main" val="3322591069"/>
       </p:ext>
     </p:extLst>
   </p:cSld>
@@ -4881,7 +5591,7 @@
         <p:spPr>
           <a:xfrm>
             <a:off x="3495413" y="444617"/>
-            <a:ext cx="3582099" cy="400110"/>
+            <a:ext cx="5723402" cy="400110"/>
           </a:xfrm>
           <a:prstGeom prst="rect">
             <a:avLst/>
@@ -4899,7 +5609,21 @@
                 <a:latin typeface="Gotham Book" pitchFamily="2" charset="0"/>
                 <a:cs typeface="Gotham Book" pitchFamily="2" charset="0"/>
               </a:rPr>
-              <a:t>Título</a:t>
+              <a:t>B</a:t>
+            </a:r>
+            <a:r>
+              <a:rPr lang="pt-BR" sz="2000" b="1" dirty="0" smtClean="0">
+                <a:latin typeface="Gotham Book" pitchFamily="2" charset="0"/>
+                <a:cs typeface="Gotham Book" pitchFamily="2" charset="0"/>
+              </a:rPr>
+              <a:t>ibliotecas </a:t>
+            </a:r>
+            <a:r>
+              <a:rPr lang="pt-BR" sz="2000" b="1" dirty="0" smtClean="0">
+                <a:latin typeface="Gotham Book" pitchFamily="2" charset="0"/>
+                <a:cs typeface="Gotham Book" pitchFamily="2" charset="0"/>
+              </a:rPr>
+              <a:t>utilizadas no node.js</a:t>
             </a:r>
             <a:endParaRPr lang="pt-BR" sz="2000" b="1" dirty="0">
               <a:latin typeface="Gotham Bold" pitchFamily="2" charset="0"/>
@@ -4922,8 +5646,8 @@
         </p:nvSpPr>
         <p:spPr>
           <a:xfrm>
-            <a:off x="3495413" y="1873956"/>
-            <a:ext cx="5201174" cy="553998"/>
+            <a:off x="3495413" y="1712031"/>
+            <a:ext cx="5201174" cy="3554819"/>
           </a:xfrm>
           <a:prstGeom prst="rect">
             <a:avLst/>
@@ -4937,16 +5661,63 @@
           <a:lstStyle/>
           <a:p>
             <a:r>
-              <a:rPr lang="pt-BR" sz="1500" dirty="0">
-                <a:latin typeface="Gotham Book" pitchFamily="2" charset="0"/>
-                <a:cs typeface="Gotham Book" pitchFamily="2" charset="0"/>
-              </a:rPr>
-              <a:t>Descrição</a:t>
-            </a:r>
-            <a:endParaRPr lang="pt-BR" sz="1500" i="1" dirty="0">
+              <a:rPr lang="pt-BR" sz="1500" b="1" dirty="0" smtClean="0">
+                <a:latin typeface="Gotham Book" pitchFamily="2" charset="0"/>
+                <a:cs typeface="Gotham Book" pitchFamily="2" charset="0"/>
+              </a:rPr>
+              <a:t>EXPRESS</a:t>
+            </a:r>
+          </a:p>
+          <a:p>
+            <a:endParaRPr lang="pt-BR" sz="1500" b="1" dirty="0">
               <a:latin typeface="Gotham Book" pitchFamily="2" charset="0"/>
               <a:cs typeface="Gotham Book" pitchFamily="2" charset="0"/>
             </a:endParaRPr>
+          </a:p>
+          <a:p>
+            <a:r>
+              <a:rPr lang="pt-BR" sz="1500" dirty="0">
+                <a:solidFill>
+                  <a:srgbClr val="00B0F0"/>
+                </a:solidFill>
+                <a:latin typeface="Gotham Book" pitchFamily="2" charset="0"/>
+                <a:cs typeface="Gotham Book" pitchFamily="2" charset="0"/>
+              </a:rPr>
+              <a:t>https://github.com/expressjs/express</a:t>
+            </a:r>
+            <a:r>
+              <a:rPr lang="pt-BR" sz="1500" b="1" dirty="0" smtClean="0">
+                <a:latin typeface="Gotham Book" pitchFamily="2" charset="0"/>
+                <a:cs typeface="Gotham Book" pitchFamily="2" charset="0"/>
+              </a:rPr>
+              <a:t/>
+            </a:r>
+            <a:br>
+              <a:rPr lang="pt-BR" sz="1500" b="1" dirty="0" smtClean="0">
+                <a:latin typeface="Gotham Book" pitchFamily="2" charset="0"/>
+                <a:cs typeface="Gotham Book" pitchFamily="2" charset="0"/>
+              </a:rPr>
+            </a:br>
+            <a:endParaRPr lang="pt-BR" sz="1500" b="1" dirty="0" smtClean="0">
+              <a:latin typeface="Gotham Book" pitchFamily="2" charset="0"/>
+              <a:cs typeface="Gotham Book" pitchFamily="2" charset="0"/>
+            </a:endParaRPr>
+          </a:p>
+          <a:p>
+            <a:r>
+              <a:rPr lang="pt-BR" sz="1500" dirty="0" smtClean="0">
+                <a:latin typeface="Gotham Book" pitchFamily="2" charset="0"/>
+                <a:cs typeface="Gotham Book" pitchFamily="2" charset="0"/>
+              </a:rPr>
+              <a:t>O Express.js é um framework que fornece os recursos mínimos para a construção de servidores web</a:t>
+            </a:r>
+            <a:r>
+              <a:rPr lang="pt-BR" sz="1500" dirty="0" smtClean="0">
+                <a:latin typeface="Gotham Book" pitchFamily="2" charset="0"/>
+                <a:cs typeface="Gotham Book" pitchFamily="2" charset="0"/>
+              </a:rPr>
+              <a:t>.</a:t>
+            </a:r>
           </a:p>
           <a:p>
             <a:endParaRPr lang="pt-BR" sz="1500" dirty="0">
@@ -4954,12 +5725,93 @@
               <a:cs typeface="Gotham Book" pitchFamily="2" charset="0"/>
             </a:endParaRPr>
           </a:p>
+          <a:p>
+            <a:r>
+              <a:rPr lang="pt-BR" sz="1500" dirty="0" smtClean="0">
+                <a:latin typeface="Gotham Book" pitchFamily="2" charset="0"/>
+                <a:cs typeface="Gotham Book" pitchFamily="2" charset="0"/>
+              </a:rPr>
+              <a:t>Ele também conta vários utilitários HTTP e recursos que possibilitam criar </a:t>
+            </a:r>
+            <a:r>
+              <a:rPr lang="pt-BR" sz="1500" dirty="0" err="1" smtClean="0">
+                <a:latin typeface="Gotham Book" pitchFamily="2" charset="0"/>
+                <a:cs typeface="Gotham Book" pitchFamily="2" charset="0"/>
+              </a:rPr>
+              <a:t>APIs</a:t>
+            </a:r>
+            <a:r>
+              <a:rPr lang="pt-BR" sz="1500" dirty="0" smtClean="0">
+                <a:latin typeface="Gotham Book" pitchFamily="2" charset="0"/>
+                <a:cs typeface="Gotham Book" pitchFamily="2" charset="0"/>
+              </a:rPr>
+              <a:t> de maneira rápida e fácil.</a:t>
+            </a:r>
+          </a:p>
+          <a:p>
+            <a:r>
+              <a:rPr lang="pt-BR" sz="1500" b="1" dirty="0" smtClean="0">
+                <a:latin typeface="Gotham Book" pitchFamily="2" charset="0"/>
+                <a:cs typeface="Gotham Book" pitchFamily="2" charset="0"/>
+              </a:rPr>
+              <a:t/>
+            </a:r>
+            <a:br>
+              <a:rPr lang="pt-BR" sz="1500" b="1" dirty="0" smtClean="0">
+                <a:latin typeface="Gotham Book" pitchFamily="2" charset="0"/>
+                <a:cs typeface="Gotham Book" pitchFamily="2" charset="0"/>
+              </a:rPr>
+            </a:br>
+            <a:r>
+              <a:rPr lang="pt-BR" sz="1500" dirty="0" smtClean="0">
+                <a:latin typeface="Gotham Book" pitchFamily="2" charset="0"/>
+                <a:cs typeface="Gotham Book" pitchFamily="2" charset="0"/>
+              </a:rPr>
+              <a:t>Foi nele que foi configurada as rotas, tratamentos de erros e etc. </a:t>
+            </a:r>
+            <a:br>
+              <a:rPr lang="pt-BR" sz="1500" dirty="0" smtClean="0">
+                <a:latin typeface="Gotham Book" pitchFamily="2" charset="0"/>
+                <a:cs typeface="Gotham Book" pitchFamily="2" charset="0"/>
+              </a:rPr>
+            </a:br>
+            <a:r>
+              <a:rPr lang="pt-BR" sz="1500" dirty="0" smtClean="0">
+                <a:latin typeface="Gotham Book" pitchFamily="2" charset="0"/>
+                <a:cs typeface="Gotham Book" pitchFamily="2" charset="0"/>
+              </a:rPr>
+              <a:t/>
+            </a:r>
+            <a:br>
+              <a:rPr lang="pt-BR" sz="1500" dirty="0" smtClean="0">
+                <a:latin typeface="Gotham Book" pitchFamily="2" charset="0"/>
+                <a:cs typeface="Gotham Book" pitchFamily="2" charset="0"/>
+              </a:rPr>
+            </a:br>
+            <a:r>
+              <a:rPr lang="pt-BR" sz="1500" dirty="0" smtClean="0">
+                <a:latin typeface="Gotham Book" pitchFamily="2" charset="0"/>
+                <a:cs typeface="Gotham Book" pitchFamily="2" charset="0"/>
+              </a:rPr>
+              <a:t>Foi a base para a construção do projeto.</a:t>
+            </a:r>
+            <a:endParaRPr lang="pt-BR" sz="1500" b="1" i="1" dirty="0">
+              <a:latin typeface="Gotham Book" pitchFamily="2" charset="0"/>
+              <a:cs typeface="Gotham Book" pitchFamily="2" charset="0"/>
+            </a:endParaRPr>
+          </a:p>
+          <a:p>
+            <a:endParaRPr lang="pt-BR" sz="1500" dirty="0">
+              <a:latin typeface="Gotham Book" pitchFamily="2" charset="0"/>
+              <a:cs typeface="Gotham Book" pitchFamily="2" charset="0"/>
+            </a:endParaRPr>
+          </a:p>
         </p:txBody>
       </p:sp>
     </p:spTree>
     <p:extLst>
       <p:ext uri="{BB962C8B-B14F-4D97-AF65-F5344CB8AC3E}">
-        <p14:creationId xmlns:p14="http://schemas.microsoft.com/office/powerpoint/2010/main" val="1274024982"/>
+        <p14:creationId xmlns:p14="http://schemas.microsoft.com/office/powerpoint/2010/main" val="536419938"/>
       </p:ext>
     </p:extLst>
   </p:cSld>
@@ -4989,93 +5841,177 @@
           <a:chExt cx="0" cy="0"/>
         </a:xfrm>
       </p:grpSpPr>
-      <p:pic>
-        <p:nvPicPr>
-          <p:cNvPr id="4" name="Imagem 3">
-            <a:extLst>
-              <a:ext uri="{FF2B5EF4-FFF2-40B4-BE49-F238E27FC236}">
-                <a16:creationId xmlns:a16="http://schemas.microsoft.com/office/drawing/2014/main" id="{BFD66423-0AA6-432C-9D58-3A0F7E3684A5}"/>
-              </a:ext>
-            </a:extLst>
-          </p:cNvPr>
-          <p:cNvPicPr>
-            <a:picLocks noChangeAspect="1"/>
-          </p:cNvPicPr>
+      <p:sp>
+        <p:nvSpPr>
+          <p:cNvPr id="2" name="CaixaDeTexto 1">
+            <a:extLst>
+              <a:ext uri="{FF2B5EF4-FFF2-40B4-BE49-F238E27FC236}">
+                <a16:creationId xmlns:a16="http://schemas.microsoft.com/office/drawing/2014/main" id="{E320B4AF-8A7C-4B16-B485-781F37053548}"/>
+              </a:ext>
+            </a:extLst>
+          </p:cNvPr>
+          <p:cNvSpPr txBox="1"/>
           <p:nvPr/>
-        </p:nvPicPr>
-        <p:blipFill>
-          <a:blip r:embed="rId2">
-            <a:extLst>
-              <a:ext uri="{28A0092B-C50C-407E-A947-70E740481C1C}">
-                <a14:useLocalDpi xmlns:a14="http://schemas.microsoft.com/office/drawing/2010/main" val="0"/>
-              </a:ext>
-            </a:extLst>
-          </a:blip>
-          <a:srcRect/>
-          <a:stretch/>
-        </p:blipFill>
+        </p:nvSpPr>
         <p:spPr>
           <a:xfrm>
-            <a:off x="-26242" y="-42972"/>
-            <a:ext cx="12244485" cy="6887522"/>
+            <a:off x="3495413" y="444617"/>
+            <a:ext cx="6114100" cy="400110"/>
           </a:xfrm>
           <a:prstGeom prst="rect">
             <a:avLst/>
           </a:prstGeom>
+          <a:noFill/>
         </p:spPr>
-      </p:pic>
-      <p:sp>
-        <p:nvSpPr>
-          <p:cNvPr id="2" name="Retângulo 1"/>
-          <p:cNvSpPr/>
+        <p:txBody>
+          <a:bodyPr wrap="square" rtlCol="0">
+            <a:spAutoFit/>
+          </a:bodyPr>
+          <a:lstStyle/>
+          <a:p>
+            <a:r>
+              <a:rPr lang="pt-BR" sz="2000" b="1" dirty="0">
+                <a:latin typeface="Gotham Book" pitchFamily="2" charset="0"/>
+                <a:cs typeface="Gotham Book" pitchFamily="2" charset="0"/>
+              </a:rPr>
+              <a:t>Bibliotecas utilizadas no node.js</a:t>
+            </a:r>
+            <a:endParaRPr lang="pt-BR" sz="2000" b="1" dirty="0">
+              <a:latin typeface="Gotham Bold" pitchFamily="2" charset="0"/>
+              <a:cs typeface="Gotham Bold" pitchFamily="2" charset="0"/>
+            </a:endParaRPr>
+          </a:p>
+        </p:txBody>
+      </p:sp>
+      <p:sp>
+        <p:nvSpPr>
+          <p:cNvPr id="3" name="CaixaDeTexto 2">
+            <a:extLst>
+              <a:ext uri="{FF2B5EF4-FFF2-40B4-BE49-F238E27FC236}">
+                <a16:creationId xmlns:a16="http://schemas.microsoft.com/office/drawing/2014/main" id="{832FD19A-27D8-40DC-BF12-FE0103F089F5}"/>
+              </a:ext>
+            </a:extLst>
+          </p:cNvPr>
+          <p:cNvSpPr txBox="1"/>
           <p:nvPr/>
         </p:nvSpPr>
         <p:spPr>
           <a:xfrm>
-            <a:off x="1629295" y="881149"/>
-            <a:ext cx="9127374" cy="5029200"/>
+            <a:off x="3495413" y="1712031"/>
+            <a:ext cx="5201174" cy="2169825"/>
           </a:xfrm>
           <a:prstGeom prst="rect">
             <a:avLst/>
           </a:prstGeom>
-          <a:solidFill>
-            <a:schemeClr val="bg1">
-              <a:lumMod val="95000"/>
-            </a:schemeClr>
-          </a:solidFill>
-          <a:ln>
-            <a:noFill/>
-          </a:ln>
+          <a:noFill/>
         </p:spPr>
-        <p:style>
-          <a:lnRef idx="2">
-            <a:schemeClr val="accent1">
-              <a:shade val="50000"/>
-            </a:schemeClr>
-          </a:lnRef>
-          <a:fillRef idx="1">
-            <a:schemeClr val="accent1"/>
-          </a:fillRef>
-          <a:effectRef idx="0">
-            <a:schemeClr val="accent1"/>
-          </a:effectRef>
-          <a:fontRef idx="minor">
-            <a:schemeClr val="lt1"/>
-          </a:fontRef>
-        </p:style>
-        <p:txBody>
-          <a:bodyPr rtlCol="0" anchor="ctr"/>
-          <a:lstStyle/>
-          <a:p>
-            <a:pPr algn="ctr"/>
-            <a:endParaRPr lang="pt-BR"/>
+        <p:txBody>
+          <a:bodyPr wrap="square" rtlCol="0">
+            <a:spAutoFit/>
+          </a:bodyPr>
+          <a:lstStyle/>
+          <a:p>
+            <a:r>
+              <a:rPr lang="pt-BR" sz="1500" b="1" dirty="0" smtClean="0">
+                <a:latin typeface="Gotham Book" pitchFamily="2" charset="0"/>
+                <a:cs typeface="Gotham Book" pitchFamily="2" charset="0"/>
+              </a:rPr>
+              <a:t>BODY-PARSER</a:t>
+            </a:r>
+          </a:p>
+          <a:p>
+            <a:endParaRPr lang="pt-BR" sz="1500" b="1" dirty="0" smtClean="0">
+              <a:latin typeface="Gotham Book" pitchFamily="2" charset="0"/>
+              <a:cs typeface="Gotham Book" pitchFamily="2" charset="0"/>
+            </a:endParaRPr>
+          </a:p>
+          <a:p>
+            <a:r>
+              <a:rPr lang="pt-BR" sz="1500" dirty="0">
+                <a:solidFill>
+                  <a:srgbClr val="00B0F0"/>
+                </a:solidFill>
+                <a:latin typeface="Gotham Book" pitchFamily="2" charset="0"/>
+                <a:cs typeface="Gotham Book" pitchFamily="2" charset="0"/>
+              </a:rPr>
+              <a:t>https://github.com/expressjs/body-parser</a:t>
+            </a:r>
+            <a:r>
+              <a:rPr lang="pt-BR" sz="1500" b="1" dirty="0" smtClean="0">
+                <a:latin typeface="Gotham Book" pitchFamily="2" charset="0"/>
+                <a:cs typeface="Gotham Book" pitchFamily="2" charset="0"/>
+              </a:rPr>
+              <a:t/>
+            </a:r>
+            <a:br>
+              <a:rPr lang="pt-BR" sz="1500" b="1" dirty="0" smtClean="0">
+                <a:latin typeface="Gotham Book" pitchFamily="2" charset="0"/>
+                <a:cs typeface="Gotham Book" pitchFamily="2" charset="0"/>
+              </a:rPr>
+            </a:br>
+            <a:endParaRPr lang="pt-BR" sz="1500" b="1" dirty="0" smtClean="0">
+              <a:latin typeface="Gotham Book" pitchFamily="2" charset="0"/>
+              <a:cs typeface="Gotham Book" pitchFamily="2" charset="0"/>
+            </a:endParaRPr>
+          </a:p>
+          <a:p>
+            <a:r>
+              <a:rPr lang="pt-BR" sz="1500" dirty="0" smtClean="0">
+                <a:latin typeface="Gotham Book" pitchFamily="2" charset="0"/>
+                <a:cs typeface="Gotham Book" pitchFamily="2" charset="0"/>
+              </a:rPr>
+              <a:t>É utilizado para limitar os tipos de requisições de entrada na aplicação. </a:t>
+            </a:r>
+          </a:p>
+          <a:p>
+            <a:endParaRPr lang="pt-BR" sz="1500" dirty="0" smtClean="0">
+              <a:latin typeface="Gotham Book" pitchFamily="2" charset="0"/>
+              <a:cs typeface="Gotham Book" pitchFamily="2" charset="0"/>
+            </a:endParaRPr>
+          </a:p>
+          <a:p>
+            <a:r>
+              <a:rPr lang="pt-BR" sz="1500" dirty="0" smtClean="0">
+                <a:latin typeface="Gotham Book" pitchFamily="2" charset="0"/>
+                <a:cs typeface="Gotham Book" pitchFamily="2" charset="0"/>
+              </a:rPr>
+              <a:t>No caso, foi limitado para receber requisições </a:t>
+            </a:r>
+            <a:r>
+              <a:rPr lang="pt-BR" sz="1500" dirty="0" err="1" smtClean="0">
+                <a:latin typeface="Gotham Book" pitchFamily="2" charset="0"/>
+                <a:cs typeface="Gotham Book" pitchFamily="2" charset="0"/>
+              </a:rPr>
+              <a:t>json</a:t>
+            </a:r>
+            <a:r>
+              <a:rPr lang="pt-BR" sz="1500" dirty="0" smtClean="0">
+                <a:latin typeface="Gotham Book" pitchFamily="2" charset="0"/>
+                <a:cs typeface="Gotham Book" pitchFamily="2" charset="0"/>
+              </a:rPr>
+              <a:t> e </a:t>
+            </a:r>
+            <a:r>
+              <a:rPr lang="pt-BR" sz="1500" dirty="0" err="1" smtClean="0">
+                <a:latin typeface="Gotham Book" pitchFamily="2" charset="0"/>
+                <a:cs typeface="Gotham Book" pitchFamily="2" charset="0"/>
+              </a:rPr>
+              <a:t>urlencoded</a:t>
+            </a:r>
+            <a:r>
+              <a:rPr lang="pt-BR" sz="1500" dirty="0" smtClean="0">
+                <a:latin typeface="Gotham Book" pitchFamily="2" charset="0"/>
+                <a:cs typeface="Gotham Book" pitchFamily="2" charset="0"/>
+              </a:rPr>
+              <a:t>.</a:t>
+            </a:r>
           </a:p>
         </p:txBody>
       </p:sp>
     </p:spTree>
     <p:extLst>
       <p:ext uri="{BB962C8B-B14F-4D97-AF65-F5344CB8AC3E}">
-        <p14:creationId xmlns:p14="http://schemas.microsoft.com/office/powerpoint/2010/main" val="285138352"/>
+        <p14:creationId xmlns:p14="http://schemas.microsoft.com/office/powerpoint/2010/main" val="920075433"/>
       </p:ext>
     </p:extLst>
   </p:cSld>

</xml_diff>

<commit_message>
Adicao das Consideracoes de PUT e PATCH na apresentacao
</commit_message>
<xml_diff>
--- a/apresentacao.pptx
+++ b/apresentacao.pptx
@@ -269,7 +269,7 @@
           <a:p>
             <a:fld id="{BFD1AF64-45C7-4B38-BC50-405CD7E676A3}" type="datetimeFigureOut">
               <a:rPr lang="pt-BR" smtClean="0"/>
-              <a:t>28/11/2021</a:t>
+              <a:t>04/12/2021</a:t>
             </a:fld>
             <a:endParaRPr lang="pt-BR"/>
           </a:p>
@@ -470,7 +470,7 @@
           <a:p>
             <a:fld id="{BFD1AF64-45C7-4B38-BC50-405CD7E676A3}" type="datetimeFigureOut">
               <a:rPr lang="pt-BR" smtClean="0"/>
-              <a:t>28/11/2021</a:t>
+              <a:t>04/12/2021</a:t>
             </a:fld>
             <a:endParaRPr lang="pt-BR"/>
           </a:p>
@@ -681,7 +681,7 @@
           <a:p>
             <a:fld id="{BFD1AF64-45C7-4B38-BC50-405CD7E676A3}" type="datetimeFigureOut">
               <a:rPr lang="pt-BR" smtClean="0"/>
-              <a:t>28/11/2021</a:t>
+              <a:t>04/12/2021</a:t>
             </a:fld>
             <a:endParaRPr lang="pt-BR"/>
           </a:p>
@@ -882,7 +882,7 @@
           <a:p>
             <a:fld id="{BFD1AF64-45C7-4B38-BC50-405CD7E676A3}" type="datetimeFigureOut">
               <a:rPr lang="pt-BR" smtClean="0"/>
-              <a:t>28/11/2021</a:t>
+              <a:t>04/12/2021</a:t>
             </a:fld>
             <a:endParaRPr lang="pt-BR"/>
           </a:p>
@@ -1160,7 +1160,7 @@
           <a:p>
             <a:fld id="{BFD1AF64-45C7-4B38-BC50-405CD7E676A3}" type="datetimeFigureOut">
               <a:rPr lang="pt-BR" smtClean="0"/>
-              <a:t>28/11/2021</a:t>
+              <a:t>04/12/2021</a:t>
             </a:fld>
             <a:endParaRPr lang="pt-BR"/>
           </a:p>
@@ -1428,7 +1428,7 @@
           <a:p>
             <a:fld id="{BFD1AF64-45C7-4B38-BC50-405CD7E676A3}" type="datetimeFigureOut">
               <a:rPr lang="pt-BR" smtClean="0"/>
-              <a:t>28/11/2021</a:t>
+              <a:t>04/12/2021</a:t>
             </a:fld>
             <a:endParaRPr lang="pt-BR"/>
           </a:p>
@@ -1843,7 +1843,7 @@
           <a:p>
             <a:fld id="{BFD1AF64-45C7-4B38-BC50-405CD7E676A3}" type="datetimeFigureOut">
               <a:rPr lang="pt-BR" smtClean="0"/>
-              <a:t>28/11/2021</a:t>
+              <a:t>04/12/2021</a:t>
             </a:fld>
             <a:endParaRPr lang="pt-BR"/>
           </a:p>
@@ -1987,7 +1987,7 @@
           <a:p>
             <a:fld id="{BFD1AF64-45C7-4B38-BC50-405CD7E676A3}" type="datetimeFigureOut">
               <a:rPr lang="pt-BR" smtClean="0"/>
-              <a:t>28/11/2021</a:t>
+              <a:t>04/12/2021</a:t>
             </a:fld>
             <a:endParaRPr lang="pt-BR"/>
           </a:p>
@@ -2103,7 +2103,7 @@
           <a:p>
             <a:fld id="{BFD1AF64-45C7-4B38-BC50-405CD7E676A3}" type="datetimeFigureOut">
               <a:rPr lang="pt-BR" smtClean="0"/>
-              <a:t>28/11/2021</a:t>
+              <a:t>04/12/2021</a:t>
             </a:fld>
             <a:endParaRPr lang="pt-BR"/>
           </a:p>
@@ -2417,7 +2417,7 @@
           <a:p>
             <a:fld id="{BFD1AF64-45C7-4B38-BC50-405CD7E676A3}" type="datetimeFigureOut">
               <a:rPr lang="pt-BR" smtClean="0"/>
-              <a:t>28/11/2021</a:t>
+              <a:t>04/12/2021</a:t>
             </a:fld>
             <a:endParaRPr lang="pt-BR"/>
           </a:p>
@@ -2708,7 +2708,7 @@
           <a:p>
             <a:fld id="{BFD1AF64-45C7-4B38-BC50-405CD7E676A3}" type="datetimeFigureOut">
               <a:rPr lang="pt-BR" smtClean="0"/>
-              <a:t>28/11/2021</a:t>
+              <a:t>04/12/2021</a:t>
             </a:fld>
             <a:endParaRPr lang="pt-BR"/>
           </a:p>
@@ -2961,7 +2961,7 @@
           <a:p>
             <a:fld id="{BFD1AF64-45C7-4B38-BC50-405CD7E676A3}" type="datetimeFigureOut">
               <a:rPr lang="pt-BR" smtClean="0"/>
-              <a:t>28/11/2021</a:t>
+              <a:t>04/12/2021</a:t>
             </a:fld>
             <a:endParaRPr lang="pt-BR"/>
           </a:p>
@@ -3450,21 +3450,7 @@
                 <a:latin typeface="Gotham Book" pitchFamily="2" charset="0"/>
                 <a:cs typeface="Gotham Book" pitchFamily="2" charset="0"/>
               </a:rPr>
-              <a:t>API REST em Node utilizando </a:t>
-            </a:r>
-            <a:r>
-              <a:rPr lang="pt-BR" sz="2800" b="1" dirty="0" smtClean="0">
-                <a:latin typeface="Gotham Book" pitchFamily="2" charset="0"/>
-                <a:cs typeface="Gotham Book" pitchFamily="2" charset="0"/>
-              </a:rPr>
-              <a:t>arquivo </a:t>
-            </a:r>
-            <a:r>
-              <a:rPr lang="pt-BR" sz="2800" b="1" dirty="0" smtClean="0">
-                <a:latin typeface="Gotham Book" pitchFamily="2" charset="0"/>
-                <a:cs typeface="Gotham Book" pitchFamily="2" charset="0"/>
-              </a:rPr>
-              <a:t>JSON</a:t>
+              <a:t>API REST em Node utilizando arquivo JSON</a:t>
             </a:r>
             <a:endParaRPr lang="pt-BR" sz="3200" b="1" dirty="0">
               <a:latin typeface="Gotham Bold" pitchFamily="2" charset="0"/>
@@ -4124,42 +4110,31 @@
                 <a:latin typeface="Gotham Book" pitchFamily="2" charset="0"/>
                 <a:cs typeface="Gotham Book" pitchFamily="2" charset="0"/>
               </a:rPr>
-              <a:t>O </a:t>
+              <a:t>O projeto foi desenvolvido utilizando Node </a:t>
+            </a:r>
+            <a:r>
+              <a:rPr lang="pt-BR" sz="1500" dirty="0" err="1" smtClean="0">
+                <a:latin typeface="Gotham Book" pitchFamily="2" charset="0"/>
+                <a:cs typeface="Gotham Book" pitchFamily="2" charset="0"/>
+              </a:rPr>
+              <a:t>Js</a:t>
             </a:r>
             <a:r>
               <a:rPr lang="pt-BR" sz="1500" dirty="0" smtClean="0">
                 <a:latin typeface="Gotham Book" pitchFamily="2" charset="0"/>
                 <a:cs typeface="Gotham Book" pitchFamily="2" charset="0"/>
               </a:rPr>
-              <a:t>projeto foi desenvolvido utilizando Node </a:t>
-            </a:r>
-            <a:r>
-              <a:rPr lang="pt-BR" sz="1500" dirty="0" err="1" smtClean="0">
-                <a:latin typeface="Gotham Book" pitchFamily="2" charset="0"/>
-                <a:cs typeface="Gotham Book" pitchFamily="2" charset="0"/>
-              </a:rPr>
-              <a:t>Js</a:t>
-            </a:r>
+              <a:t>.</a:t>
+            </a:r>
+          </a:p>
+          <a:p>
             <a:r>
               <a:rPr lang="pt-BR" sz="1500" dirty="0" smtClean="0">
                 <a:latin typeface="Gotham Book" pitchFamily="2" charset="0"/>
                 <a:cs typeface="Gotham Book" pitchFamily="2" charset="0"/>
               </a:rPr>
-              <a:t>.</a:t>
-            </a:r>
-          </a:p>
-          <a:p>
-            <a:r>
-              <a:rPr lang="pt-BR" sz="1500" dirty="0" smtClean="0">
-                <a:latin typeface="Gotham Book" pitchFamily="2" charset="0"/>
-                <a:cs typeface="Gotham Book" pitchFamily="2" charset="0"/>
-              </a:rPr>
               <a:t> </a:t>
             </a:r>
-            <a:endParaRPr lang="pt-BR" sz="1500" dirty="0" smtClean="0">
-              <a:latin typeface="Gotham Book" pitchFamily="2" charset="0"/>
-              <a:cs typeface="Gotham Book" pitchFamily="2" charset="0"/>
-            </a:endParaRPr>
           </a:p>
           <a:p>
             <a:r>
@@ -4708,14 +4683,7 @@
                 <a:latin typeface="Gotham Book" pitchFamily="2" charset="0"/>
                 <a:cs typeface="Gotham Book" pitchFamily="2" charset="0"/>
               </a:rPr>
-              <a:t>, dado que o consumidor recebe um JSON com a resposta de sua </a:t>
-            </a:r>
-            <a:r>
-              <a:rPr lang="pt-BR" sz="1500" dirty="0" smtClean="0">
-                <a:latin typeface="Gotham Book" pitchFamily="2" charset="0"/>
-                <a:cs typeface="Gotham Book" pitchFamily="2" charset="0"/>
-              </a:rPr>
-              <a:t>requisição.</a:t>
+              <a:t>, dado que o consumidor recebe um JSON com a resposta de sua requisição.</a:t>
             </a:r>
           </a:p>
           <a:p>
@@ -4844,19 +4812,8 @@
                 <a:latin typeface="Gotham Book" pitchFamily="2" charset="0"/>
                 <a:cs typeface="Gotham Book" pitchFamily="2" charset="0"/>
               </a:rPr>
-              <a:t>, que é o arquivo de </a:t>
-            </a:r>
-            <a:r>
-              <a:rPr lang="pt-BR" sz="1500" dirty="0" smtClean="0">
-                <a:latin typeface="Gotham Book" pitchFamily="2" charset="0"/>
-                <a:cs typeface="Gotham Book" pitchFamily="2" charset="0"/>
-              </a:rPr>
-              <a:t>rotas.</a:t>
-            </a:r>
-            <a:endParaRPr lang="pt-BR" sz="1500" dirty="0" smtClean="0">
-              <a:latin typeface="Gotham Book" pitchFamily="2" charset="0"/>
-              <a:cs typeface="Gotham Book" pitchFamily="2" charset="0"/>
-            </a:endParaRPr>
+              <a:t>, que é o arquivo de rotas.</a:t>
+            </a:r>
           </a:p>
           <a:p>
             <a:endParaRPr lang="pt-BR" sz="1500" dirty="0">
@@ -5046,11 +5003,147 @@
           <a:lstStyle/>
           <a:p>
             <a:r>
+              <a:rPr lang="pt-BR" sz="1500" b="1" dirty="0" smtClean="0">
+                <a:latin typeface="Gotham Book" pitchFamily="2" charset="0"/>
+                <a:cs typeface="Gotham Book" pitchFamily="2" charset="0"/>
+              </a:rPr>
+              <a:t>Métodos PUT e PATCH</a:t>
+            </a:r>
+            <a:endParaRPr lang="pt-BR" sz="1500" b="1" dirty="0">
+              <a:latin typeface="Gotham Book" pitchFamily="2" charset="0"/>
+              <a:cs typeface="Gotham Book" pitchFamily="2" charset="0"/>
+            </a:endParaRPr>
+          </a:p>
+          <a:p>
+            <a:endParaRPr lang="pt-BR" sz="1500" dirty="0" smtClean="0">
+              <a:latin typeface="Gotham Book" pitchFamily="2" charset="0"/>
+              <a:cs typeface="Gotham Book" pitchFamily="2" charset="0"/>
+            </a:endParaRPr>
+          </a:p>
+          <a:p>
+            <a:endParaRPr lang="pt-BR" sz="1500" i="1" dirty="0">
+              <a:latin typeface="Gotham Book" pitchFamily="2" charset="0"/>
+              <a:cs typeface="Gotham Book" pitchFamily="2" charset="0"/>
+            </a:endParaRPr>
+          </a:p>
+          <a:p>
+            <a:endParaRPr lang="pt-BR" sz="1500" i="1" dirty="0">
+              <a:latin typeface="Gotham Book" pitchFamily="2" charset="0"/>
+              <a:cs typeface="Gotham Book" pitchFamily="2" charset="0"/>
+            </a:endParaRPr>
+          </a:p>
+          <a:p>
+            <a:endParaRPr lang="pt-BR" sz="1500" dirty="0">
+              <a:latin typeface="Gotham Book" pitchFamily="2" charset="0"/>
+              <a:cs typeface="Gotham Book" pitchFamily="2" charset="0"/>
+            </a:endParaRPr>
+          </a:p>
+        </p:txBody>
+      </p:sp>
+      <p:sp>
+        <p:nvSpPr>
+          <p:cNvPr id="4" name="CaixaDeTexto 3">
+            <a:extLst>
+              <a:ext uri="{FF2B5EF4-FFF2-40B4-BE49-F238E27FC236}">
+                <a16:creationId xmlns:a16="http://schemas.microsoft.com/office/drawing/2014/main" id="{832FD19A-27D8-40DC-BF12-FE0103F089F5}"/>
+              </a:ext>
+            </a:extLst>
+          </p:cNvPr>
+          <p:cNvSpPr txBox="1"/>
+          <p:nvPr/>
+        </p:nvSpPr>
+        <p:spPr>
+          <a:xfrm>
+            <a:off x="3435493" y="1903406"/>
+            <a:ext cx="6955415" cy="4016484"/>
+          </a:xfrm>
+          <a:prstGeom prst="rect">
+            <a:avLst/>
+          </a:prstGeom>
+          <a:noFill/>
+        </p:spPr>
+        <p:txBody>
+          <a:bodyPr wrap="square" rtlCol="0">
+            <a:spAutoFit/>
+          </a:bodyPr>
+          <a:lstStyle/>
+          <a:p>
+            <a:r>
               <a:rPr lang="pt-BR" sz="1500" dirty="0" smtClean="0">
                 <a:latin typeface="Gotham Book" pitchFamily="2" charset="0"/>
                 <a:cs typeface="Gotham Book" pitchFamily="2" charset="0"/>
               </a:rPr>
-              <a:t>Métodos PUT e PATCH</a:t>
+              <a:t>Optou-se por fazer com que só seja possível utilizar o PUT em clientes já existentes. A razão para isso é que a lógica para controlar a inserção de novos objetos  aumentaria consideravelmente (por conta da lógica do id) se ele fosse utilizado para também poder inserir objetos. Além de que seria necessária uma lógica adicional para o ordenamento do </a:t>
+            </a:r>
+            <a:r>
+              <a:rPr lang="pt-BR" sz="1500" dirty="0" err="1" smtClean="0">
+                <a:latin typeface="Gotham Book" pitchFamily="2" charset="0"/>
+                <a:cs typeface="Gotham Book" pitchFamily="2" charset="0"/>
+              </a:rPr>
+              <a:t>array</a:t>
+            </a:r>
+            <a:r>
+              <a:rPr lang="pt-BR" sz="1500" dirty="0" smtClean="0">
+                <a:latin typeface="Gotham Book" pitchFamily="2" charset="0"/>
+                <a:cs typeface="Gotham Book" pitchFamily="2" charset="0"/>
+              </a:rPr>
+              <a:t>. </a:t>
+            </a:r>
+            <a:br>
+              <a:rPr lang="pt-BR" sz="1500" dirty="0" smtClean="0">
+                <a:latin typeface="Gotham Book" pitchFamily="2" charset="0"/>
+                <a:cs typeface="Gotham Book" pitchFamily="2" charset="0"/>
+              </a:rPr>
+            </a:br>
+            <a:endParaRPr lang="pt-BR" sz="1500" dirty="0" smtClean="0">
+              <a:latin typeface="Gotham Book" pitchFamily="2" charset="0"/>
+              <a:cs typeface="Gotham Book" pitchFamily="2" charset="0"/>
+            </a:endParaRPr>
+          </a:p>
+          <a:p>
+            <a:r>
+              <a:rPr lang="pt-BR" sz="1500" dirty="0" smtClean="0">
+                <a:latin typeface="Gotham Book" pitchFamily="2" charset="0"/>
+                <a:cs typeface="Gotham Book" pitchFamily="2" charset="0"/>
+              </a:rPr>
+              <a:t>Resumindo:</a:t>
+            </a:r>
+          </a:p>
+          <a:p>
+            <a:r>
+              <a:rPr lang="pt-BR" sz="1500" dirty="0" smtClean="0">
+                <a:latin typeface="Gotham Book" pitchFamily="2" charset="0"/>
+                <a:cs typeface="Gotham Book" pitchFamily="2" charset="0"/>
+              </a:rPr>
+              <a:t/>
+            </a:r>
+            <a:br>
+              <a:rPr lang="pt-BR" sz="1500" dirty="0" smtClean="0">
+                <a:latin typeface="Gotham Book" pitchFamily="2" charset="0"/>
+                <a:cs typeface="Gotham Book" pitchFamily="2" charset="0"/>
+              </a:rPr>
+            </a:br>
+            <a:r>
+              <a:rPr lang="pt-BR" sz="1500" dirty="0" smtClean="0">
+                <a:latin typeface="Gotham Book" pitchFamily="2" charset="0"/>
+                <a:cs typeface="Gotham Book" pitchFamily="2" charset="0"/>
+              </a:rPr>
+              <a:t>Na forma atual, o PUT serve para substituir todos os campos de um elemento já existente.</a:t>
+            </a:r>
+          </a:p>
+          <a:p>
+            <a:endParaRPr lang="pt-BR" sz="1500" dirty="0">
+              <a:latin typeface="Gotham Book" pitchFamily="2" charset="0"/>
+              <a:cs typeface="Gotham Book" pitchFamily="2" charset="0"/>
+            </a:endParaRPr>
+          </a:p>
+          <a:p>
+            <a:r>
+              <a:rPr lang="pt-BR" sz="1500" dirty="0" smtClean="0">
+                <a:latin typeface="Gotham Book" pitchFamily="2" charset="0"/>
+                <a:cs typeface="Gotham Book" pitchFamily="2" charset="0"/>
+              </a:rPr>
+              <a:t>O PATCH, por sua vez, permite alterar campos conforme a necessidade em um elemento já existente.</a:t>
             </a:r>
             <a:endParaRPr lang="pt-BR" sz="1500" dirty="0">
               <a:latin typeface="Gotham Book" pitchFamily="2" charset="0"/>
@@ -5236,10 +5329,6 @@
               </a:rPr>
               <a:t>Se tudo estiver certo, irá aparecer no console a seguinte mensagem:</a:t>
             </a:r>
-            <a:endParaRPr lang="pt-BR" sz="1500" dirty="0" smtClean="0">
-              <a:latin typeface="Gotham Book" pitchFamily="2" charset="0"/>
-              <a:cs typeface="Gotham Book" pitchFamily="2" charset="0"/>
-            </a:endParaRPr>
           </a:p>
           <a:p>
             <a:endParaRPr lang="pt-BR" sz="1500" i="1" dirty="0">
@@ -5616,14 +5705,7 @@
                 <a:latin typeface="Gotham Book" pitchFamily="2" charset="0"/>
                 <a:cs typeface="Gotham Book" pitchFamily="2" charset="0"/>
               </a:rPr>
-              <a:t>ibliotecas </a:t>
-            </a:r>
-            <a:r>
-              <a:rPr lang="pt-BR" sz="2000" b="1" dirty="0" smtClean="0">
-                <a:latin typeface="Gotham Book" pitchFamily="2" charset="0"/>
-                <a:cs typeface="Gotham Book" pitchFamily="2" charset="0"/>
-              </a:rPr>
-              <a:t>utilizadas no node.js</a:t>
+              <a:t>ibliotecas utilizadas no node.js</a:t>
             </a:r>
             <a:endParaRPr lang="pt-BR" sz="2000" b="1" dirty="0">
               <a:latin typeface="Gotham Bold" pitchFamily="2" charset="0"/>
@@ -5709,14 +5791,7 @@
                 <a:latin typeface="Gotham Book" pitchFamily="2" charset="0"/>
                 <a:cs typeface="Gotham Book" pitchFamily="2" charset="0"/>
               </a:rPr>
-              <a:t>O Express.js é um framework que fornece os recursos mínimos para a construção de servidores web</a:t>
-            </a:r>
-            <a:r>
-              <a:rPr lang="pt-BR" sz="1500" dirty="0" smtClean="0">
-                <a:latin typeface="Gotham Book" pitchFamily="2" charset="0"/>
-                <a:cs typeface="Gotham Book" pitchFamily="2" charset="0"/>
-              </a:rPr>
-              <a:t>.</a:t>
+              <a:t>O Express.js é um framework que fornece os recursos mínimos para a construção de servidores web.</a:t>
             </a:r>
           </a:p>
           <a:p>

</xml_diff>